<commit_message>
Delete unnecessary parts, update documentation and readmes.
</commit_message>
<xml_diff>
--- a/documentation/Präsentation/Präsentation_App.pptx
+++ b/documentation/Präsentation/Präsentation_App.pptx
@@ -2,44 +2,56 @@
 <file path=ppt/presentation.xml><?xml version="1.0" encoding="utf-8"?>
 <p:presentation xmlns:a="http://schemas.openxmlformats.org/drawingml/2006/main" xmlns:r="http://schemas.openxmlformats.org/officeDocument/2006/relationships" xmlns:mc="http://schemas.openxmlformats.org/markup-compatibility/2006" xmlns:mv="urn:schemas-microsoft-com:mac:vml" xmlns:p="http://schemas.openxmlformats.org/presentationml/2006/main" xmlns:c="http://schemas.openxmlformats.org/drawingml/2006/chart" xmlns:dgm="http://schemas.openxmlformats.org/drawingml/2006/diagram" xmlns:o="urn:schemas-microsoft-com:office:office" xmlns:v="urn:schemas-microsoft-com:vml" xmlns:pvml="urn:schemas-microsoft-com:office:powerpoint" xmlns:com="http://schemas.openxmlformats.org/drawingml/2006/compatibility" xmlns:p14="http://schemas.microsoft.com/office/powerpoint/2010/main" xmlns:p15="http://schemas.microsoft.com/office/powerpoint/2012/main" autoCompressPictures="0" embedTrueTypeFonts="1" strictFirstAndLastChars="0" saveSubsetFonts="1">
   <p:sldMasterIdLst>
-    <p:sldMasterId id="2147483660" r:id="rId4"/>
+    <p:sldMasterId id="2147483660" r:id="rId5"/>
   </p:sldMasterIdLst>
   <p:notesMasterIdLst>
-    <p:notesMasterId r:id="rId5"/>
+    <p:notesMasterId r:id="rId6"/>
   </p:notesMasterIdLst>
   <p:sldIdLst>
-    <p:sldId id="256" r:id="rId6"/>
-    <p:sldId id="257" r:id="rId7"/>
-    <p:sldId id="258" r:id="rId8"/>
-    <p:sldId id="259" r:id="rId9"/>
-    <p:sldId id="260" r:id="rId10"/>
-    <p:sldId id="261" r:id="rId11"/>
-    <p:sldId id="262" r:id="rId12"/>
-    <p:sldId id="263" r:id="rId13"/>
-    <p:sldId id="264" r:id="rId14"/>
-    <p:sldId id="265" r:id="rId15"/>
-    <p:sldId id="266" r:id="rId16"/>
-    <p:sldId id="267" r:id="rId17"/>
-    <p:sldId id="268" r:id="rId18"/>
-    <p:sldId id="269" r:id="rId19"/>
-    <p:sldId id="270" r:id="rId20"/>
+    <p:sldId id="256" r:id="rId7"/>
+    <p:sldId id="257" r:id="rId8"/>
+    <p:sldId id="258" r:id="rId9"/>
+    <p:sldId id="259" r:id="rId10"/>
+    <p:sldId id="260" r:id="rId11"/>
+    <p:sldId id="261" r:id="rId12"/>
+    <p:sldId id="262" r:id="rId13"/>
+    <p:sldId id="263" r:id="rId14"/>
+    <p:sldId id="264" r:id="rId15"/>
+    <p:sldId id="265" r:id="rId16"/>
+    <p:sldId id="266" r:id="rId17"/>
+    <p:sldId id="267" r:id="rId18"/>
+    <p:sldId id="268" r:id="rId19"/>
+    <p:sldId id="269" r:id="rId20"/>
+    <p:sldId id="270" r:id="rId21"/>
+    <p:sldId id="271" r:id="rId22"/>
+    <p:sldId id="272" r:id="rId23"/>
+    <p:sldId id="273" r:id="rId24"/>
+    <p:sldId id="274" r:id="rId25"/>
+    <p:sldId id="275" r:id="rId26"/>
   </p:sldIdLst>
   <p:sldSz cy="5143500" cx="9144000"/>
   <p:notesSz cx="6858000" cy="9144000"/>
   <p:embeddedFontLst>
     <p:embeddedFont>
       <p:font typeface="Raleway"/>
-      <p:regular r:id="rId21"/>
-      <p:bold r:id="rId22"/>
-      <p:italic r:id="rId23"/>
-      <p:boldItalic r:id="rId24"/>
+      <p:regular r:id="rId27"/>
+      <p:bold r:id="rId28"/>
+      <p:italic r:id="rId29"/>
+      <p:boldItalic r:id="rId30"/>
+    </p:embeddedFont>
+    <p:embeddedFont>
+      <p:font typeface="Roboto"/>
+      <p:regular r:id="rId31"/>
+      <p:bold r:id="rId32"/>
+      <p:italic r:id="rId33"/>
+      <p:boldItalic r:id="rId34"/>
     </p:embeddedFont>
     <p:embeddedFont>
       <p:font typeface="Lato"/>
-      <p:regular r:id="rId25"/>
-      <p:bold r:id="rId26"/>
-      <p:italic r:id="rId27"/>
-      <p:boldItalic r:id="rId28"/>
+      <p:regular r:id="rId35"/>
+      <p:bold r:id="rId36"/>
+      <p:italic r:id="rId37"/>
+      <p:boldItalic r:id="rId38"/>
     </p:embeddedFont>
   </p:embeddedFontLst>
   <p:defaultTextStyle>
@@ -288,6 +300,29 @@
     </p:ext>
   </p:extLst>
 </p:presentation>
+</file>
+
+<file path=ppt/commentAuthors.xml><?xml version="1.0" encoding="utf-8"?>
+<p:cmAuthorLst xmlns:a="http://schemas.openxmlformats.org/drawingml/2006/main" xmlns:r="http://schemas.openxmlformats.org/officeDocument/2006/relationships" xmlns:mc="http://schemas.openxmlformats.org/markup-compatibility/2006" xmlns:mv="urn:schemas-microsoft-com:mac:vml" xmlns:p="http://schemas.openxmlformats.org/presentationml/2006/main" xmlns:c="http://schemas.openxmlformats.org/drawingml/2006/chart" xmlns:dgm="http://schemas.openxmlformats.org/drawingml/2006/diagram" xmlns:o="urn:schemas-microsoft-com:office:office" xmlns:v="urn:schemas-microsoft-com:vml" xmlns:pvml="urn:schemas-microsoft-com:office:powerpoint" xmlns:com="http://schemas.openxmlformats.org/drawingml/2006/compatibility" xmlns:p14="http://schemas.microsoft.com/office/powerpoint/2010/main" xmlns:p15="http://schemas.microsoft.com/office/powerpoint/2012/main">
+  <p:cmAuthor clrIdx="0" id="0" initials="" lastIdx="3" name="Lukas Müller"/>
+</p:cmAuthorLst>
+</file>
+
+<file path=ppt/comments/comment1.xml><?xml version="1.0" encoding="utf-8"?>
+<p:cmLst xmlns:a="http://schemas.openxmlformats.org/drawingml/2006/main" xmlns:r="http://schemas.openxmlformats.org/officeDocument/2006/relationships" xmlns:mc="http://schemas.openxmlformats.org/markup-compatibility/2006" xmlns:mv="urn:schemas-microsoft-com:mac:vml" xmlns:p="http://schemas.openxmlformats.org/presentationml/2006/main" xmlns:c="http://schemas.openxmlformats.org/drawingml/2006/chart" xmlns:dgm="http://schemas.openxmlformats.org/drawingml/2006/diagram" xmlns:o="urn:schemas-microsoft-com:office:office" xmlns:v="urn:schemas-microsoft-com:vml" xmlns:pvml="urn:schemas-microsoft-com:office:powerpoint" xmlns:com="http://schemas.openxmlformats.org/drawingml/2006/compatibility" xmlns:p14="http://schemas.microsoft.com/office/powerpoint/2010/main" xmlns:p15="http://schemas.microsoft.com/office/powerpoint/2012/main">
+  <p:cm authorId="0" idx="1" dt="2020-07-13T16:24:00.351">
+    <p:pos x="2415" y="1432"/>
+    <p:text>Lukas</p:text>
+  </p:cm>
+  <p:cm authorId="0" idx="2" dt="2020-07-13T16:24:08.699">
+    <p:pos x="4151" y="1432"/>
+    <p:text>Alex</p:text>
+  </p:cm>
+  <p:cm authorId="0" idx="3" dt="2020-07-13T16:23:51.332">
+    <p:pos x="815" y="1432"/>
+    <p:text>Manuel</p:text>
+  </p:cm>
+</p:cmLst>
 </file>
 
 <file path=ppt/notesMasters/notesMaster1.xml><?xml version="1.0" encoding="utf-8"?>
@@ -820,7 +855,7 @@
   <p:cSld>
     <p:spTree>
       <p:nvGrpSpPr>
-        <p:cNvPr id="153" name="Shape 153"/>
+        <p:cNvPr id="160" name="Shape 160"/>
         <p:cNvGrpSpPr/>
         <p:nvPr/>
       </p:nvGrpSpPr>
@@ -834,7 +869,7 @@
       </p:grpSpPr>
       <p:sp>
         <p:nvSpPr>
-          <p:cNvPr id="154" name="Google Shape;154;g8232309a7c_0_205:notes"/>
+          <p:cNvPr id="161" name="Google Shape;161;g8c0cc5ee34_0_674:notes"/>
           <p:cNvSpPr/>
           <p:nvPr>
             <p:ph idx="2" type="sldImg"/>
@@ -869,7 +904,7 @@
       </p:sp>
       <p:sp>
         <p:nvSpPr>
-          <p:cNvPr id="155" name="Google Shape;155;g8232309a7c_0_205:notes"/>
+          <p:cNvPr id="162" name="Google Shape;162;g8c0cc5ee34_0_674:notes"/>
           <p:cNvSpPr txBox="1"/>
           <p:nvPr>
             <p:ph idx="1" type="body"/>
@@ -919,7 +954,7 @@
   <p:cSld>
     <p:spTree>
       <p:nvGrpSpPr>
-        <p:cNvPr id="160" name="Shape 160"/>
+        <p:cNvPr id="167" name="Shape 167"/>
         <p:cNvGrpSpPr/>
         <p:nvPr/>
       </p:nvGrpSpPr>
@@ -933,7 +968,7 @@
       </p:grpSpPr>
       <p:sp>
         <p:nvSpPr>
-          <p:cNvPr id="161" name="Google Shape;161;g8232309a7c_0_211:notes"/>
+          <p:cNvPr id="168" name="Google Shape;168;g8232309a7c_0_102:notes"/>
           <p:cNvSpPr/>
           <p:nvPr>
             <p:ph idx="2" type="sldImg"/>
@@ -968,7 +1003,7 @@
       </p:sp>
       <p:sp>
         <p:nvSpPr>
-          <p:cNvPr id="162" name="Google Shape;162;g8232309a7c_0_211:notes"/>
+          <p:cNvPr id="169" name="Google Shape;169;g8232309a7c_0_102:notes"/>
           <p:cNvSpPr txBox="1"/>
           <p:nvPr>
             <p:ph idx="1" type="body"/>
@@ -1018,7 +1053,7 @@
   <p:cSld>
     <p:spTree>
       <p:nvGrpSpPr>
-        <p:cNvPr id="166" name="Shape 166"/>
+        <p:cNvPr id="174" name="Shape 174"/>
         <p:cNvGrpSpPr/>
         <p:nvPr/>
       </p:nvGrpSpPr>
@@ -1032,7 +1067,7 @@
       </p:grpSpPr>
       <p:sp>
         <p:nvSpPr>
-          <p:cNvPr id="167" name="Google Shape;167;g8232309a7c_0_217:notes"/>
+          <p:cNvPr id="175" name="Google Shape;175;g8c01f115df_0_10:notes"/>
           <p:cNvSpPr/>
           <p:nvPr>
             <p:ph idx="2" type="sldImg"/>
@@ -1067,7 +1102,7 @@
       </p:sp>
       <p:sp>
         <p:nvSpPr>
-          <p:cNvPr id="168" name="Google Shape;168;g8232309a7c_0_217:notes"/>
+          <p:cNvPr id="176" name="Google Shape;176;g8c01f115df_0_10:notes"/>
           <p:cNvSpPr txBox="1"/>
           <p:nvPr>
             <p:ph idx="1" type="body"/>
@@ -1117,7 +1152,7 @@
   <p:cSld>
     <p:spTree>
       <p:nvGrpSpPr>
-        <p:cNvPr id="172" name="Shape 172"/>
+        <p:cNvPr id="180" name="Shape 180"/>
         <p:cNvGrpSpPr/>
         <p:nvPr/>
       </p:nvGrpSpPr>
@@ -1131,7 +1166,7 @@
       </p:grpSpPr>
       <p:sp>
         <p:nvSpPr>
-          <p:cNvPr id="173" name="Google Shape;173;g8232309a7c_0_114:notes"/>
+          <p:cNvPr id="181" name="Google Shape;181;g8c01f115df_0_17:notes"/>
           <p:cNvSpPr/>
           <p:nvPr>
             <p:ph idx="2" type="sldImg"/>
@@ -1166,7 +1201,7 @@
       </p:sp>
       <p:sp>
         <p:nvSpPr>
-          <p:cNvPr id="174" name="Google Shape;174;g8232309a7c_0_114:notes"/>
+          <p:cNvPr id="182" name="Google Shape;182;g8c01f115df_0_17:notes"/>
           <p:cNvSpPr txBox="1"/>
           <p:nvPr>
             <p:ph idx="1" type="body"/>
@@ -1216,7 +1251,7 @@
   <p:cSld>
     <p:spTree>
       <p:nvGrpSpPr>
-        <p:cNvPr id="177" name="Shape 177"/>
+        <p:cNvPr id="186" name="Shape 186"/>
         <p:cNvGrpSpPr/>
         <p:nvPr/>
       </p:nvGrpSpPr>
@@ -1230,7 +1265,7 @@
       </p:grpSpPr>
       <p:sp>
         <p:nvSpPr>
-          <p:cNvPr id="178" name="Google Shape;178;g8232309a7c_0_928:notes"/>
+          <p:cNvPr id="187" name="Google Shape;187;g8c01f115df_0_0:notes"/>
           <p:cNvSpPr/>
           <p:nvPr>
             <p:ph idx="2" type="sldImg"/>
@@ -1265,7 +1300,7 @@
       </p:sp>
       <p:sp>
         <p:nvSpPr>
-          <p:cNvPr id="179" name="Google Shape;179;g8232309a7c_0_928:notes"/>
+          <p:cNvPr id="188" name="Google Shape;188;g8c01f115df_0_0:notes"/>
           <p:cNvSpPr txBox="1"/>
           <p:nvPr>
             <p:ph idx="1" type="body"/>
@@ -1315,7 +1350,7 @@
   <p:cSld>
     <p:spTree>
       <p:nvGrpSpPr>
-        <p:cNvPr id="183" name="Shape 183"/>
+        <p:cNvPr id="192" name="Shape 192"/>
         <p:cNvGrpSpPr/>
         <p:nvPr/>
       </p:nvGrpSpPr>
@@ -1329,7 +1364,7 @@
       </p:grpSpPr>
       <p:sp>
         <p:nvSpPr>
-          <p:cNvPr id="184" name="Google Shape;184;g8232309a7c_0_933:notes"/>
+          <p:cNvPr id="193" name="Google Shape;193;g8c01f115df_0_5:notes"/>
           <p:cNvSpPr/>
           <p:nvPr>
             <p:ph idx="2" type="sldImg"/>
@@ -1364,7 +1399,403 @@
       </p:sp>
       <p:sp>
         <p:nvSpPr>
-          <p:cNvPr id="185" name="Google Shape;185;g8232309a7c_0_933:notes"/>
+          <p:cNvPr id="194" name="Google Shape;194;g8c01f115df_0_5:notes"/>
+          <p:cNvSpPr txBox="1"/>
+          <p:nvPr>
+            <p:ph idx="1" type="body"/>
+          </p:nvPr>
+        </p:nvSpPr>
+        <p:spPr>
+          <a:xfrm>
+            <a:off x="685800" y="4343400"/>
+            <a:ext cx="5486400" cy="4114800"/>
+          </a:xfrm>
+          <a:prstGeom prst="rect">
+            <a:avLst/>
+          </a:prstGeom>
+        </p:spPr>
+        <p:txBody>
+          <a:bodyPr anchorCtr="0" anchor="t" bIns="91425" lIns="91425" spcFirstLastPara="1" rIns="91425" wrap="square" tIns="91425">
+            <a:noAutofit/>
+          </a:bodyPr>
+          <a:lstStyle/>
+          <a:p>
+            <a:pPr indent="0" lvl="0" marL="0" rtl="0" algn="l">
+              <a:spcBef>
+                <a:spcPts val="0"/>
+              </a:spcBef>
+              <a:spcAft>
+                <a:spcPts val="0"/>
+              </a:spcAft>
+              <a:buNone/>
+            </a:pPr>
+            <a:r>
+              <a:t/>
+            </a:r>
+            <a:endParaRPr/>
+          </a:p>
+        </p:txBody>
+      </p:sp>
+    </p:spTree>
+  </p:cSld>
+  <p:clrMapOvr>
+    <a:masterClrMapping/>
+  </p:clrMapOvr>
+</p:notes>
+</file>
+
+<file path=ppt/notesSlides/notesSlide16.xml><?xml version="1.0" encoding="utf-8"?>
+<p:notes xmlns:a="http://schemas.openxmlformats.org/drawingml/2006/main" xmlns:r="http://schemas.openxmlformats.org/officeDocument/2006/relationships" xmlns:mc="http://schemas.openxmlformats.org/markup-compatibility/2006" xmlns:mv="urn:schemas-microsoft-com:mac:vml" xmlns:p="http://schemas.openxmlformats.org/presentationml/2006/main" xmlns:c="http://schemas.openxmlformats.org/drawingml/2006/chart" xmlns:dgm="http://schemas.openxmlformats.org/drawingml/2006/diagram" xmlns:o="urn:schemas-microsoft-com:office:office" xmlns:v="urn:schemas-microsoft-com:vml" xmlns:pvml="urn:schemas-microsoft-com:office:powerpoint" xmlns:com="http://schemas.openxmlformats.org/drawingml/2006/compatibility" xmlns:p14="http://schemas.microsoft.com/office/powerpoint/2010/main" xmlns:p15="http://schemas.microsoft.com/office/powerpoint/2012/main" showMasterPhAnim="0" showMasterSp="0">
+  <p:cSld>
+    <p:spTree>
+      <p:nvGrpSpPr>
+        <p:cNvPr id="198" name="Shape 198"/>
+        <p:cNvGrpSpPr/>
+        <p:nvPr/>
+      </p:nvGrpSpPr>
+      <p:grpSpPr>
+        <a:xfrm>
+          <a:off x="0" y="0"/>
+          <a:ext cx="0" cy="0"/>
+          <a:chOff x="0" y="0"/>
+          <a:chExt cx="0" cy="0"/>
+        </a:xfrm>
+      </p:grpSpPr>
+      <p:sp>
+        <p:nvSpPr>
+          <p:cNvPr id="199" name="Google Shape;199;g8232309a7c_0_205:notes"/>
+          <p:cNvSpPr/>
+          <p:nvPr>
+            <p:ph idx="2" type="sldImg"/>
+          </p:nvPr>
+        </p:nvSpPr>
+        <p:spPr>
+          <a:xfrm>
+            <a:off x="381300" y="685800"/>
+            <a:ext cx="6096000" cy="3429000"/>
+          </a:xfrm>
+          <a:custGeom>
+            <a:rect b="b" l="l" r="r" t="t"/>
+            <a:pathLst>
+              <a:path extrusionOk="0" h="120000" w="120000">
+                <a:moveTo>
+                  <a:pt x="0" y="0"/>
+                </a:moveTo>
+                <a:lnTo>
+                  <a:pt x="120000" y="0"/>
+                </a:lnTo>
+                <a:lnTo>
+                  <a:pt x="120000" y="120000"/>
+                </a:lnTo>
+                <a:lnTo>
+                  <a:pt x="0" y="120000"/>
+                </a:lnTo>
+                <a:close/>
+              </a:path>
+            </a:pathLst>
+          </a:custGeom>
+        </p:spPr>
+      </p:sp>
+      <p:sp>
+        <p:nvSpPr>
+          <p:cNvPr id="200" name="Google Shape;200;g8232309a7c_0_205:notes"/>
+          <p:cNvSpPr txBox="1"/>
+          <p:nvPr>
+            <p:ph idx="1" type="body"/>
+          </p:nvPr>
+        </p:nvSpPr>
+        <p:spPr>
+          <a:xfrm>
+            <a:off x="685800" y="4343400"/>
+            <a:ext cx="5486400" cy="4114800"/>
+          </a:xfrm>
+          <a:prstGeom prst="rect">
+            <a:avLst/>
+          </a:prstGeom>
+        </p:spPr>
+        <p:txBody>
+          <a:bodyPr anchorCtr="0" anchor="t" bIns="91425" lIns="91425" spcFirstLastPara="1" rIns="91425" wrap="square" tIns="91425">
+            <a:noAutofit/>
+          </a:bodyPr>
+          <a:lstStyle/>
+          <a:p>
+            <a:pPr indent="0" lvl="0" marL="0" rtl="0" algn="l">
+              <a:spcBef>
+                <a:spcPts val="0"/>
+              </a:spcBef>
+              <a:spcAft>
+                <a:spcPts val="0"/>
+              </a:spcAft>
+              <a:buNone/>
+            </a:pPr>
+            <a:r>
+              <a:t/>
+            </a:r>
+            <a:endParaRPr/>
+          </a:p>
+        </p:txBody>
+      </p:sp>
+    </p:spTree>
+  </p:cSld>
+  <p:clrMapOvr>
+    <a:masterClrMapping/>
+  </p:clrMapOvr>
+</p:notes>
+</file>
+
+<file path=ppt/notesSlides/notesSlide17.xml><?xml version="1.0" encoding="utf-8"?>
+<p:notes xmlns:a="http://schemas.openxmlformats.org/drawingml/2006/main" xmlns:r="http://schemas.openxmlformats.org/officeDocument/2006/relationships" xmlns:mc="http://schemas.openxmlformats.org/markup-compatibility/2006" xmlns:mv="urn:schemas-microsoft-com:mac:vml" xmlns:p="http://schemas.openxmlformats.org/presentationml/2006/main" xmlns:c="http://schemas.openxmlformats.org/drawingml/2006/chart" xmlns:dgm="http://schemas.openxmlformats.org/drawingml/2006/diagram" xmlns:o="urn:schemas-microsoft-com:office:office" xmlns:v="urn:schemas-microsoft-com:vml" xmlns:pvml="urn:schemas-microsoft-com:office:powerpoint" xmlns:com="http://schemas.openxmlformats.org/drawingml/2006/compatibility" xmlns:p14="http://schemas.microsoft.com/office/powerpoint/2010/main" xmlns:p15="http://schemas.microsoft.com/office/powerpoint/2012/main" showMasterPhAnim="0" showMasterSp="0">
+  <p:cSld>
+    <p:spTree>
+      <p:nvGrpSpPr>
+        <p:cNvPr id="205" name="Shape 205"/>
+        <p:cNvGrpSpPr/>
+        <p:nvPr/>
+      </p:nvGrpSpPr>
+      <p:grpSpPr>
+        <a:xfrm>
+          <a:off x="0" y="0"/>
+          <a:ext cx="0" cy="0"/>
+          <a:chOff x="0" y="0"/>
+          <a:chExt cx="0" cy="0"/>
+        </a:xfrm>
+      </p:grpSpPr>
+      <p:sp>
+        <p:nvSpPr>
+          <p:cNvPr id="206" name="Google Shape;206;g8232309a7c_0_217:notes"/>
+          <p:cNvSpPr/>
+          <p:nvPr>
+            <p:ph idx="2" type="sldImg"/>
+          </p:nvPr>
+        </p:nvSpPr>
+        <p:spPr>
+          <a:xfrm>
+            <a:off x="381300" y="685800"/>
+            <a:ext cx="6096000" cy="3429000"/>
+          </a:xfrm>
+          <a:custGeom>
+            <a:rect b="b" l="l" r="r" t="t"/>
+            <a:pathLst>
+              <a:path extrusionOk="0" h="120000" w="120000">
+                <a:moveTo>
+                  <a:pt x="0" y="0"/>
+                </a:moveTo>
+                <a:lnTo>
+                  <a:pt x="120000" y="0"/>
+                </a:lnTo>
+                <a:lnTo>
+                  <a:pt x="120000" y="120000"/>
+                </a:lnTo>
+                <a:lnTo>
+                  <a:pt x="0" y="120000"/>
+                </a:lnTo>
+                <a:close/>
+              </a:path>
+            </a:pathLst>
+          </a:custGeom>
+        </p:spPr>
+      </p:sp>
+      <p:sp>
+        <p:nvSpPr>
+          <p:cNvPr id="207" name="Google Shape;207;g8232309a7c_0_217:notes"/>
+          <p:cNvSpPr txBox="1"/>
+          <p:nvPr>
+            <p:ph idx="1" type="body"/>
+          </p:nvPr>
+        </p:nvSpPr>
+        <p:spPr>
+          <a:xfrm>
+            <a:off x="685800" y="4343400"/>
+            <a:ext cx="5486400" cy="4114800"/>
+          </a:xfrm>
+          <a:prstGeom prst="rect">
+            <a:avLst/>
+          </a:prstGeom>
+        </p:spPr>
+        <p:txBody>
+          <a:bodyPr anchorCtr="0" anchor="t" bIns="91425" lIns="91425" spcFirstLastPara="1" rIns="91425" wrap="square" tIns="91425">
+            <a:noAutofit/>
+          </a:bodyPr>
+          <a:lstStyle/>
+          <a:p>
+            <a:pPr indent="0" lvl="0" marL="0" rtl="0" algn="l">
+              <a:spcBef>
+                <a:spcPts val="0"/>
+              </a:spcBef>
+              <a:spcAft>
+                <a:spcPts val="0"/>
+              </a:spcAft>
+              <a:buNone/>
+            </a:pPr>
+            <a:r>
+              <a:t/>
+            </a:r>
+            <a:endParaRPr/>
+          </a:p>
+        </p:txBody>
+      </p:sp>
+    </p:spTree>
+  </p:cSld>
+  <p:clrMapOvr>
+    <a:masterClrMapping/>
+  </p:clrMapOvr>
+</p:notes>
+</file>
+
+<file path=ppt/notesSlides/notesSlide18.xml><?xml version="1.0" encoding="utf-8"?>
+<p:notes xmlns:a="http://schemas.openxmlformats.org/drawingml/2006/main" xmlns:r="http://schemas.openxmlformats.org/officeDocument/2006/relationships" xmlns:mc="http://schemas.openxmlformats.org/markup-compatibility/2006" xmlns:mv="urn:schemas-microsoft-com:mac:vml" xmlns:p="http://schemas.openxmlformats.org/presentationml/2006/main" xmlns:c="http://schemas.openxmlformats.org/drawingml/2006/chart" xmlns:dgm="http://schemas.openxmlformats.org/drawingml/2006/diagram" xmlns:o="urn:schemas-microsoft-com:office:office" xmlns:v="urn:schemas-microsoft-com:vml" xmlns:pvml="urn:schemas-microsoft-com:office:powerpoint" xmlns:com="http://schemas.openxmlformats.org/drawingml/2006/compatibility" xmlns:p14="http://schemas.microsoft.com/office/powerpoint/2010/main" xmlns:p15="http://schemas.microsoft.com/office/powerpoint/2012/main" showMasterPhAnim="0" showMasterSp="0">
+  <p:cSld>
+    <p:spTree>
+      <p:nvGrpSpPr>
+        <p:cNvPr id="211" name="Shape 211"/>
+        <p:cNvGrpSpPr/>
+        <p:nvPr/>
+      </p:nvGrpSpPr>
+      <p:grpSpPr>
+        <a:xfrm>
+          <a:off x="0" y="0"/>
+          <a:ext cx="0" cy="0"/>
+          <a:chOff x="0" y="0"/>
+          <a:chExt cx="0" cy="0"/>
+        </a:xfrm>
+      </p:grpSpPr>
+      <p:sp>
+        <p:nvSpPr>
+          <p:cNvPr id="212" name="Google Shape;212;g8232309a7c_0_114:notes"/>
+          <p:cNvSpPr/>
+          <p:nvPr>
+            <p:ph idx="2" type="sldImg"/>
+          </p:nvPr>
+        </p:nvSpPr>
+        <p:spPr>
+          <a:xfrm>
+            <a:off x="381300" y="685800"/>
+            <a:ext cx="6096000" cy="3429000"/>
+          </a:xfrm>
+          <a:custGeom>
+            <a:rect b="b" l="l" r="r" t="t"/>
+            <a:pathLst>
+              <a:path extrusionOk="0" h="120000" w="120000">
+                <a:moveTo>
+                  <a:pt x="0" y="0"/>
+                </a:moveTo>
+                <a:lnTo>
+                  <a:pt x="120000" y="0"/>
+                </a:lnTo>
+                <a:lnTo>
+                  <a:pt x="120000" y="120000"/>
+                </a:lnTo>
+                <a:lnTo>
+                  <a:pt x="0" y="120000"/>
+                </a:lnTo>
+                <a:close/>
+              </a:path>
+            </a:pathLst>
+          </a:custGeom>
+        </p:spPr>
+      </p:sp>
+      <p:sp>
+        <p:nvSpPr>
+          <p:cNvPr id="213" name="Google Shape;213;g8232309a7c_0_114:notes"/>
+          <p:cNvSpPr txBox="1"/>
+          <p:nvPr>
+            <p:ph idx="1" type="body"/>
+          </p:nvPr>
+        </p:nvSpPr>
+        <p:spPr>
+          <a:xfrm>
+            <a:off x="685800" y="4343400"/>
+            <a:ext cx="5486400" cy="4114800"/>
+          </a:xfrm>
+          <a:prstGeom prst="rect">
+            <a:avLst/>
+          </a:prstGeom>
+        </p:spPr>
+        <p:txBody>
+          <a:bodyPr anchorCtr="0" anchor="t" bIns="91425" lIns="91425" spcFirstLastPara="1" rIns="91425" wrap="square" tIns="91425">
+            <a:noAutofit/>
+          </a:bodyPr>
+          <a:lstStyle/>
+          <a:p>
+            <a:pPr indent="0" lvl="0" marL="0" rtl="0" algn="l">
+              <a:spcBef>
+                <a:spcPts val="0"/>
+              </a:spcBef>
+              <a:spcAft>
+                <a:spcPts val="0"/>
+              </a:spcAft>
+              <a:buNone/>
+            </a:pPr>
+            <a:r>
+              <a:t/>
+            </a:r>
+            <a:endParaRPr/>
+          </a:p>
+        </p:txBody>
+      </p:sp>
+    </p:spTree>
+  </p:cSld>
+  <p:clrMapOvr>
+    <a:masterClrMapping/>
+  </p:clrMapOvr>
+</p:notes>
+</file>
+
+<file path=ppt/notesSlides/notesSlide19.xml><?xml version="1.0" encoding="utf-8"?>
+<p:notes xmlns:a="http://schemas.openxmlformats.org/drawingml/2006/main" xmlns:r="http://schemas.openxmlformats.org/officeDocument/2006/relationships" xmlns:mc="http://schemas.openxmlformats.org/markup-compatibility/2006" xmlns:mv="urn:schemas-microsoft-com:mac:vml" xmlns:p="http://schemas.openxmlformats.org/presentationml/2006/main" xmlns:c="http://schemas.openxmlformats.org/drawingml/2006/chart" xmlns:dgm="http://schemas.openxmlformats.org/drawingml/2006/diagram" xmlns:o="urn:schemas-microsoft-com:office:office" xmlns:v="urn:schemas-microsoft-com:vml" xmlns:pvml="urn:schemas-microsoft-com:office:powerpoint" xmlns:com="http://schemas.openxmlformats.org/drawingml/2006/compatibility" xmlns:p14="http://schemas.microsoft.com/office/powerpoint/2010/main" xmlns:p15="http://schemas.microsoft.com/office/powerpoint/2012/main" showMasterPhAnim="0" showMasterSp="0">
+  <p:cSld>
+    <p:spTree>
+      <p:nvGrpSpPr>
+        <p:cNvPr id="216" name="Shape 216"/>
+        <p:cNvGrpSpPr/>
+        <p:nvPr/>
+      </p:nvGrpSpPr>
+      <p:grpSpPr>
+        <a:xfrm>
+          <a:off x="0" y="0"/>
+          <a:ext cx="0" cy="0"/>
+          <a:chOff x="0" y="0"/>
+          <a:chExt cx="0" cy="0"/>
+        </a:xfrm>
+      </p:grpSpPr>
+      <p:sp>
+        <p:nvSpPr>
+          <p:cNvPr id="217" name="Google Shape;217;g8232309a7c_0_928:notes"/>
+          <p:cNvSpPr/>
+          <p:nvPr>
+            <p:ph idx="2" type="sldImg"/>
+          </p:nvPr>
+        </p:nvSpPr>
+        <p:spPr>
+          <a:xfrm>
+            <a:off x="381300" y="685800"/>
+            <a:ext cx="6096000" cy="3429000"/>
+          </a:xfrm>
+          <a:custGeom>
+            <a:rect b="b" l="l" r="r" t="t"/>
+            <a:pathLst>
+              <a:path extrusionOk="0" h="120000" w="120000">
+                <a:moveTo>
+                  <a:pt x="0" y="0"/>
+                </a:moveTo>
+                <a:lnTo>
+                  <a:pt x="120000" y="0"/>
+                </a:lnTo>
+                <a:lnTo>
+                  <a:pt x="120000" y="120000"/>
+                </a:lnTo>
+                <a:lnTo>
+                  <a:pt x="0" y="120000"/>
+                </a:lnTo>
+                <a:close/>
+              </a:path>
+            </a:pathLst>
+          </a:custGeom>
+        </p:spPr>
+      </p:sp>
+      <p:sp>
+        <p:nvSpPr>
+          <p:cNvPr id="218" name="Google Shape;218;g8232309a7c_0_928:notes"/>
           <p:cNvSpPr txBox="1"/>
           <p:nvPr>
             <p:ph idx="1" type="body"/>
@@ -1508,6 +1939,105 @@
 </p:notes>
 </file>
 
+<file path=ppt/notesSlides/notesSlide20.xml><?xml version="1.0" encoding="utf-8"?>
+<p:notes xmlns:a="http://schemas.openxmlformats.org/drawingml/2006/main" xmlns:r="http://schemas.openxmlformats.org/officeDocument/2006/relationships" xmlns:mc="http://schemas.openxmlformats.org/markup-compatibility/2006" xmlns:mv="urn:schemas-microsoft-com:mac:vml" xmlns:p="http://schemas.openxmlformats.org/presentationml/2006/main" xmlns:c="http://schemas.openxmlformats.org/drawingml/2006/chart" xmlns:dgm="http://schemas.openxmlformats.org/drawingml/2006/diagram" xmlns:o="urn:schemas-microsoft-com:office:office" xmlns:v="urn:schemas-microsoft-com:vml" xmlns:pvml="urn:schemas-microsoft-com:office:powerpoint" xmlns:com="http://schemas.openxmlformats.org/drawingml/2006/compatibility" xmlns:p14="http://schemas.microsoft.com/office/powerpoint/2010/main" xmlns:p15="http://schemas.microsoft.com/office/powerpoint/2012/main" showMasterPhAnim="0" showMasterSp="0">
+  <p:cSld>
+    <p:spTree>
+      <p:nvGrpSpPr>
+        <p:cNvPr id="222" name="Shape 222"/>
+        <p:cNvGrpSpPr/>
+        <p:nvPr/>
+      </p:nvGrpSpPr>
+      <p:grpSpPr>
+        <a:xfrm>
+          <a:off x="0" y="0"/>
+          <a:ext cx="0" cy="0"/>
+          <a:chOff x="0" y="0"/>
+          <a:chExt cx="0" cy="0"/>
+        </a:xfrm>
+      </p:grpSpPr>
+      <p:sp>
+        <p:nvSpPr>
+          <p:cNvPr id="223" name="Google Shape;223;g8232309a7c_0_933:notes"/>
+          <p:cNvSpPr/>
+          <p:nvPr>
+            <p:ph idx="2" type="sldImg"/>
+          </p:nvPr>
+        </p:nvSpPr>
+        <p:spPr>
+          <a:xfrm>
+            <a:off x="381300" y="685800"/>
+            <a:ext cx="6096000" cy="3429000"/>
+          </a:xfrm>
+          <a:custGeom>
+            <a:rect b="b" l="l" r="r" t="t"/>
+            <a:pathLst>
+              <a:path extrusionOk="0" h="120000" w="120000">
+                <a:moveTo>
+                  <a:pt x="0" y="0"/>
+                </a:moveTo>
+                <a:lnTo>
+                  <a:pt x="120000" y="0"/>
+                </a:lnTo>
+                <a:lnTo>
+                  <a:pt x="120000" y="120000"/>
+                </a:lnTo>
+                <a:lnTo>
+                  <a:pt x="0" y="120000"/>
+                </a:lnTo>
+                <a:close/>
+              </a:path>
+            </a:pathLst>
+          </a:custGeom>
+        </p:spPr>
+      </p:sp>
+      <p:sp>
+        <p:nvSpPr>
+          <p:cNvPr id="224" name="Google Shape;224;g8232309a7c_0_933:notes"/>
+          <p:cNvSpPr txBox="1"/>
+          <p:nvPr>
+            <p:ph idx="1" type="body"/>
+          </p:nvPr>
+        </p:nvSpPr>
+        <p:spPr>
+          <a:xfrm>
+            <a:off x="685800" y="4343400"/>
+            <a:ext cx="5486400" cy="4114800"/>
+          </a:xfrm>
+          <a:prstGeom prst="rect">
+            <a:avLst/>
+          </a:prstGeom>
+        </p:spPr>
+        <p:txBody>
+          <a:bodyPr anchorCtr="0" anchor="t" bIns="91425" lIns="91425" spcFirstLastPara="1" rIns="91425" wrap="square" tIns="91425">
+            <a:noAutofit/>
+          </a:bodyPr>
+          <a:lstStyle/>
+          <a:p>
+            <a:pPr indent="0" lvl="0" marL="0" rtl="0" algn="l">
+              <a:spcBef>
+                <a:spcPts val="0"/>
+              </a:spcBef>
+              <a:spcAft>
+                <a:spcPts val="0"/>
+              </a:spcAft>
+              <a:buNone/>
+            </a:pPr>
+            <a:r>
+              <a:t/>
+            </a:r>
+            <a:endParaRPr/>
+          </a:p>
+        </p:txBody>
+      </p:sp>
+    </p:spTree>
+  </p:cSld>
+  <p:clrMapOvr>
+    <a:masterClrMapping/>
+  </p:clrMapOvr>
+</p:notes>
+</file>
+
 <file path=ppt/notesSlides/notesSlide3.xml><?xml version="1.0" encoding="utf-8"?>
 <p:notes xmlns:a="http://schemas.openxmlformats.org/drawingml/2006/main" xmlns:r="http://schemas.openxmlformats.org/officeDocument/2006/relationships" xmlns:mc="http://schemas.openxmlformats.org/markup-compatibility/2006" xmlns:mv="urn:schemas-microsoft-com:mac:vml" xmlns:p="http://schemas.openxmlformats.org/presentationml/2006/main" xmlns:c="http://schemas.openxmlformats.org/drawingml/2006/chart" xmlns:dgm="http://schemas.openxmlformats.org/drawingml/2006/diagram" xmlns:o="urn:schemas-microsoft-com:office:office" xmlns:v="urn:schemas-microsoft-com:vml" xmlns:pvml="urn:schemas-microsoft-com:office:powerpoint" xmlns:com="http://schemas.openxmlformats.org/drawingml/2006/compatibility" xmlns:p14="http://schemas.microsoft.com/office/powerpoint/2010/main" xmlns:p15="http://schemas.microsoft.com/office/powerpoint/2012/main" showMasterPhAnim="0" showMasterSp="0">
   <p:cSld>
@@ -1626,7 +2156,7 @@
       </p:grpSpPr>
       <p:sp>
         <p:nvSpPr>
-          <p:cNvPr id="117" name="Google Shape;117;g8232309a7c_0_120:notes"/>
+          <p:cNvPr id="117" name="Google Shape;117;g8c0cc5ee34_0_2:notes"/>
           <p:cNvSpPr/>
           <p:nvPr>
             <p:ph idx="2" type="sldImg"/>
@@ -1661,7 +2191,7 @@
       </p:sp>
       <p:sp>
         <p:nvSpPr>
-          <p:cNvPr id="118" name="Google Shape;118;g8232309a7c_0_120:notes"/>
+          <p:cNvPr id="118" name="Google Shape;118;g8c0cc5ee34_0_2:notes"/>
           <p:cNvSpPr txBox="1"/>
           <p:nvPr>
             <p:ph idx="1" type="body"/>
@@ -1711,7 +2241,7 @@
   <p:cSld>
     <p:spTree>
       <p:nvGrpSpPr>
-        <p:cNvPr id="122" name="Shape 122"/>
+        <p:cNvPr id="123" name="Shape 123"/>
         <p:cNvGrpSpPr/>
         <p:nvPr/>
       </p:nvGrpSpPr>
@@ -1725,7 +2255,7 @@
       </p:grpSpPr>
       <p:sp>
         <p:nvSpPr>
-          <p:cNvPr id="123" name="Google Shape;123;g8232309a7c_0_138:notes"/>
+          <p:cNvPr id="124" name="Google Shape;124;g8232309a7c_0_184:notes"/>
           <p:cNvSpPr/>
           <p:nvPr>
             <p:ph idx="2" type="sldImg"/>
@@ -1760,7 +2290,7 @@
       </p:sp>
       <p:sp>
         <p:nvSpPr>
-          <p:cNvPr id="124" name="Google Shape;124;g8232309a7c_0_138:notes"/>
+          <p:cNvPr id="125" name="Google Shape;125;g8232309a7c_0_184:notes"/>
           <p:cNvSpPr txBox="1"/>
           <p:nvPr>
             <p:ph idx="1" type="body"/>
@@ -1810,7 +2340,7 @@
   <p:cSld>
     <p:spTree>
       <p:nvGrpSpPr>
-        <p:cNvPr id="128" name="Shape 128"/>
+        <p:cNvPr id="129" name="Shape 129"/>
         <p:cNvGrpSpPr/>
         <p:nvPr/>
       </p:nvGrpSpPr>
@@ -1824,7 +2354,7 @@
       </p:grpSpPr>
       <p:sp>
         <p:nvSpPr>
-          <p:cNvPr id="129" name="Google Shape;129;g8232309a7c_0_143:notes"/>
+          <p:cNvPr id="130" name="Google Shape;130;g8c0cc5ee34_0_8:notes"/>
           <p:cNvSpPr/>
           <p:nvPr>
             <p:ph idx="2" type="sldImg"/>
@@ -1859,7 +2389,7 @@
       </p:sp>
       <p:sp>
         <p:nvSpPr>
-          <p:cNvPr id="130" name="Google Shape;130;g8232309a7c_0_143:notes"/>
+          <p:cNvPr id="131" name="Google Shape;131;g8c0cc5ee34_0_8:notes"/>
           <p:cNvSpPr txBox="1"/>
           <p:nvPr>
             <p:ph idx="1" type="body"/>
@@ -1909,7 +2439,7 @@
   <p:cSld>
     <p:spTree>
       <p:nvGrpSpPr>
-        <p:cNvPr id="134" name="Shape 134"/>
+        <p:cNvPr id="137" name="Shape 137"/>
         <p:cNvGrpSpPr/>
         <p:nvPr/>
       </p:nvGrpSpPr>
@@ -1923,7 +2453,7 @@
       </p:grpSpPr>
       <p:sp>
         <p:nvSpPr>
-          <p:cNvPr id="135" name="Google Shape;135;g8232309a7c_0_102:notes"/>
+          <p:cNvPr id="138" name="Google Shape;138;g8c0cc5ee34_0_510:notes"/>
           <p:cNvSpPr/>
           <p:nvPr>
             <p:ph idx="2" type="sldImg"/>
@@ -1958,7 +2488,7 @@
       </p:sp>
       <p:sp>
         <p:nvSpPr>
-          <p:cNvPr id="136" name="Google Shape;136;g8232309a7c_0_102:notes"/>
+          <p:cNvPr id="139" name="Google Shape;139;g8c0cc5ee34_0_510:notes"/>
           <p:cNvSpPr txBox="1"/>
           <p:nvPr>
             <p:ph idx="1" type="body"/>
@@ -2008,7 +2538,7 @@
   <p:cSld>
     <p:spTree>
       <p:nvGrpSpPr>
-        <p:cNvPr id="141" name="Shape 141"/>
+        <p:cNvPr id="147" name="Shape 147"/>
         <p:cNvGrpSpPr/>
         <p:nvPr/>
       </p:nvGrpSpPr>
@@ -2022,7 +2552,7 @@
       </p:grpSpPr>
       <p:sp>
         <p:nvSpPr>
-          <p:cNvPr id="142" name="Google Shape;142;g8232309a7c_0_184:notes"/>
+          <p:cNvPr id="148" name="Google Shape;148;g8232309a7c_0_143:notes"/>
           <p:cNvSpPr/>
           <p:nvPr>
             <p:ph idx="2" type="sldImg"/>
@@ -2057,7 +2587,7 @@
       </p:sp>
       <p:sp>
         <p:nvSpPr>
-          <p:cNvPr id="143" name="Google Shape;143;g8232309a7c_0_184:notes"/>
+          <p:cNvPr id="149" name="Google Shape;149;g8232309a7c_0_143:notes"/>
           <p:cNvSpPr txBox="1"/>
           <p:nvPr>
             <p:ph idx="1" type="body"/>
@@ -2107,7 +2637,7 @@
   <p:cSld>
     <p:spTree>
       <p:nvGrpSpPr>
-        <p:cNvPr id="147" name="Shape 147"/>
+        <p:cNvPr id="153" name="Shape 153"/>
         <p:cNvGrpSpPr/>
         <p:nvPr/>
       </p:nvGrpSpPr>
@@ -2121,7 +2651,7 @@
       </p:grpSpPr>
       <p:sp>
         <p:nvSpPr>
-          <p:cNvPr id="148" name="Google Shape;148;g8232309a7c_0_190:notes"/>
+          <p:cNvPr id="154" name="Google Shape;154;g8c0cc5ee34_0_667:notes"/>
           <p:cNvSpPr/>
           <p:nvPr>
             <p:ph idx="2" type="sldImg"/>
@@ -2156,7 +2686,7 @@
       </p:sp>
       <p:sp>
         <p:nvSpPr>
-          <p:cNvPr id="149" name="Google Shape;149;g8232309a7c_0_190:notes"/>
+          <p:cNvPr id="155" name="Google Shape;155;g8c0cc5ee34_0_667:notes"/>
           <p:cNvSpPr txBox="1"/>
           <p:nvPr>
             <p:ph idx="1" type="body"/>
@@ -9671,149 +10201,6 @@
   <p:cSld>
     <p:spTree>
       <p:nvGrpSpPr>
-        <p:cNvPr id="156" name="Shape 156"/>
-        <p:cNvGrpSpPr/>
-        <p:nvPr/>
-      </p:nvGrpSpPr>
-      <p:grpSpPr>
-        <a:xfrm>
-          <a:off x="0" y="0"/>
-          <a:ext cx="0" cy="0"/>
-          <a:chOff x="0" y="0"/>
-          <a:chExt cx="0" cy="0"/>
-        </a:xfrm>
-      </p:grpSpPr>
-      <p:sp>
-        <p:nvSpPr>
-          <p:cNvPr id="157" name="Google Shape;157;p23"/>
-          <p:cNvSpPr txBox="1"/>
-          <p:nvPr>
-            <p:ph type="title"/>
-          </p:nvPr>
-        </p:nvSpPr>
-        <p:spPr>
-          <a:xfrm>
-            <a:off x="730000" y="1318650"/>
-            <a:ext cx="3300900" cy="1687200"/>
-          </a:xfrm>
-          <a:prstGeom prst="rect">
-            <a:avLst/>
-          </a:prstGeom>
-        </p:spPr>
-        <p:txBody>
-          <a:bodyPr anchorCtr="0" anchor="t" bIns="91425" lIns="91425" spcFirstLastPara="1" rIns="91425" wrap="square" tIns="91425">
-            <a:noAutofit/>
-          </a:bodyPr>
-          <a:lstStyle/>
-          <a:p>
-            <a:pPr indent="0" lvl="0" marL="0" rtl="0" algn="l">
-              <a:spcBef>
-                <a:spcPts val="0"/>
-              </a:spcBef>
-              <a:spcAft>
-                <a:spcPts val="0"/>
-              </a:spcAft>
-              <a:buNone/>
-            </a:pPr>
-            <a:r>
-              <a:rPr lang="de"/>
-              <a:t>3. Ergebnis</a:t>
-            </a:r>
-            <a:endParaRPr/>
-          </a:p>
-        </p:txBody>
-      </p:sp>
-      <p:sp>
-        <p:nvSpPr>
-          <p:cNvPr id="158" name="Google Shape;158;p23"/>
-          <p:cNvSpPr txBox="1"/>
-          <p:nvPr>
-            <p:ph idx="2" type="body"/>
-          </p:nvPr>
-        </p:nvSpPr>
-        <p:spPr>
-          <a:xfrm>
-            <a:off x="5174225" y="1352625"/>
-            <a:ext cx="3374400" cy="3025500"/>
-          </a:xfrm>
-          <a:prstGeom prst="rect">
-            <a:avLst/>
-          </a:prstGeom>
-        </p:spPr>
-        <p:txBody>
-          <a:bodyPr anchorCtr="0" anchor="t" bIns="91425" lIns="91425" spcFirstLastPara="1" rIns="91425" wrap="square" tIns="91425">
-            <a:noAutofit/>
-          </a:bodyPr>
-          <a:lstStyle/>
-          <a:p>
-            <a:pPr indent="0" lvl="0" marL="0" rtl="0" algn="l">
-              <a:spcBef>
-                <a:spcPts val="0"/>
-              </a:spcBef>
-              <a:spcAft>
-                <a:spcPts val="1600"/>
-              </a:spcAft>
-              <a:buNone/>
-            </a:pPr>
-            <a:r>
-              <a:t/>
-            </a:r>
-            <a:endParaRPr/>
-          </a:p>
-        </p:txBody>
-      </p:sp>
-      <p:sp>
-        <p:nvSpPr>
-          <p:cNvPr id="159" name="Google Shape;159;p23"/>
-          <p:cNvSpPr txBox="1"/>
-          <p:nvPr>
-            <p:ph idx="1" type="subTitle"/>
-          </p:nvPr>
-        </p:nvSpPr>
-        <p:spPr>
-          <a:xfrm>
-            <a:off x="724950" y="3161525"/>
-            <a:ext cx="3300900" cy="759000"/>
-          </a:xfrm>
-          <a:prstGeom prst="rect">
-            <a:avLst/>
-          </a:prstGeom>
-        </p:spPr>
-        <p:txBody>
-          <a:bodyPr anchorCtr="0" anchor="t" bIns="91425" lIns="91425" spcFirstLastPara="1" rIns="91425" wrap="square" tIns="91425">
-            <a:noAutofit/>
-          </a:bodyPr>
-          <a:lstStyle/>
-          <a:p>
-            <a:pPr indent="0" lvl="0" marL="0" rtl="0" algn="l">
-              <a:spcBef>
-                <a:spcPts val="0"/>
-              </a:spcBef>
-              <a:spcAft>
-                <a:spcPts val="0"/>
-              </a:spcAft>
-              <a:buNone/>
-            </a:pPr>
-            <a:r>
-              <a:t/>
-            </a:r>
-            <a:endParaRPr/>
-          </a:p>
-        </p:txBody>
-      </p:sp>
-    </p:spTree>
-  </p:cSld>
-  <p:clrMapOvr>
-    <a:masterClrMapping/>
-  </p:clrMapOvr>
-</p:sld>
-</file>
-
-<file path=ppt/slides/slide11.xml><?xml version="1.0" encoding="utf-8"?>
-<p:sld xmlns:a="http://schemas.openxmlformats.org/drawingml/2006/main" xmlns:r="http://schemas.openxmlformats.org/officeDocument/2006/relationships" xmlns:mc="http://schemas.openxmlformats.org/markup-compatibility/2006" xmlns:mv="urn:schemas-microsoft-com:mac:vml" xmlns:p="http://schemas.openxmlformats.org/presentationml/2006/main" xmlns:c="http://schemas.openxmlformats.org/drawingml/2006/chart" xmlns:dgm="http://schemas.openxmlformats.org/drawingml/2006/diagram" xmlns:o="urn:schemas-microsoft-com:office:office" xmlns:v="urn:schemas-microsoft-com:vml" xmlns:pvml="urn:schemas-microsoft-com:office:powerpoint" xmlns:com="http://schemas.openxmlformats.org/drawingml/2006/compatibility" xmlns:p14="http://schemas.microsoft.com/office/powerpoint/2010/main" xmlns:p15="http://schemas.microsoft.com/office/powerpoint/2012/main">
-  <p:cSld>
-    <p:spTree>
-      <p:nvGrpSpPr>
         <p:cNvPr id="163" name="Shape 163"/>
         <p:cNvGrpSpPr/>
         <p:nvPr/>
@@ -9828,7 +10215,7 @@
       </p:grpSpPr>
       <p:sp>
         <p:nvSpPr>
-          <p:cNvPr id="164" name="Google Shape;164;p24"/>
+          <p:cNvPr id="164" name="Google Shape;164;p23"/>
           <p:cNvSpPr txBox="1"/>
           <p:nvPr>
             <p:ph type="title"/>
@@ -9860,7 +10247,7 @@
             </a:pPr>
             <a:r>
               <a:rPr lang="de"/>
-              <a:t>Backend</a:t>
+              <a:t>Sitemap</a:t>
             </a:r>
             <a:endParaRPr/>
           </a:p>
@@ -9868,7 +10255,7 @@
       </p:sp>
       <p:sp>
         <p:nvSpPr>
-          <p:cNvPr id="165" name="Google Shape;165;p24"/>
+          <p:cNvPr id="165" name="Google Shape;165;p23"/>
           <p:cNvSpPr txBox="1"/>
           <p:nvPr>
             <p:ph idx="1" type="body"/>
@@ -9899,7 +10286,191 @@
               <a:buNone/>
             </a:pPr>
             <a:r>
-              <a:t/>
+              <a:rPr lang="de"/>
+              <a:t>Operator</a:t>
+            </a:r>
+            <a:endParaRPr/>
+          </a:p>
+        </p:txBody>
+      </p:sp>
+      <p:pic>
+        <p:nvPicPr>
+          <p:cNvPr id="166" name="Google Shape;166;p23"/>
+          <p:cNvPicPr preferRelativeResize="0"/>
+          <p:nvPr/>
+        </p:nvPicPr>
+        <p:blipFill>
+          <a:blip r:embed="rId3">
+            <a:alphaModFix/>
+          </a:blip>
+          <a:stretch>
+            <a:fillRect/>
+          </a:stretch>
+        </p:blipFill>
+        <p:spPr>
+          <a:xfrm>
+            <a:off x="3188375" y="904375"/>
+            <a:ext cx="3719750" cy="4078150"/>
+          </a:xfrm>
+          <a:prstGeom prst="rect">
+            <a:avLst/>
+          </a:prstGeom>
+          <a:noFill/>
+          <a:ln>
+            <a:noFill/>
+          </a:ln>
+        </p:spPr>
+      </p:pic>
+    </p:spTree>
+  </p:cSld>
+  <p:clrMapOvr>
+    <a:masterClrMapping/>
+  </p:clrMapOvr>
+</p:sld>
+</file>
+
+<file path=ppt/slides/slide11.xml><?xml version="1.0" encoding="utf-8"?>
+<p:sld xmlns:a="http://schemas.openxmlformats.org/drawingml/2006/main" xmlns:r="http://schemas.openxmlformats.org/officeDocument/2006/relationships" xmlns:mc="http://schemas.openxmlformats.org/markup-compatibility/2006" xmlns:mv="urn:schemas-microsoft-com:mac:vml" xmlns:p="http://schemas.openxmlformats.org/presentationml/2006/main" xmlns:c="http://schemas.openxmlformats.org/drawingml/2006/chart" xmlns:dgm="http://schemas.openxmlformats.org/drawingml/2006/diagram" xmlns:o="urn:schemas-microsoft-com:office:office" xmlns:v="urn:schemas-microsoft-com:vml" xmlns:pvml="urn:schemas-microsoft-com:office:powerpoint" xmlns:com="http://schemas.openxmlformats.org/drawingml/2006/compatibility" xmlns:p14="http://schemas.microsoft.com/office/powerpoint/2010/main" xmlns:p15="http://schemas.microsoft.com/office/powerpoint/2012/main">
+  <p:cSld>
+    <p:spTree>
+      <p:nvGrpSpPr>
+        <p:cNvPr id="170" name="Shape 170"/>
+        <p:cNvGrpSpPr/>
+        <p:nvPr/>
+      </p:nvGrpSpPr>
+      <p:grpSpPr>
+        <a:xfrm>
+          <a:off x="0" y="0"/>
+          <a:ext cx="0" cy="0"/>
+          <a:chOff x="0" y="0"/>
+          <a:chExt cx="0" cy="0"/>
+        </a:xfrm>
+      </p:grpSpPr>
+      <p:sp>
+        <p:nvSpPr>
+          <p:cNvPr id="171" name="Google Shape;171;p24"/>
+          <p:cNvSpPr txBox="1"/>
+          <p:nvPr>
+            <p:ph type="title"/>
+          </p:nvPr>
+        </p:nvSpPr>
+        <p:spPr>
+          <a:xfrm>
+            <a:off x="730000" y="1318650"/>
+            <a:ext cx="3300900" cy="1687200"/>
+          </a:xfrm>
+          <a:prstGeom prst="rect">
+            <a:avLst/>
+          </a:prstGeom>
+        </p:spPr>
+        <p:txBody>
+          <a:bodyPr anchorCtr="0" anchor="t" bIns="91425" lIns="91425" spcFirstLastPara="1" rIns="91425" wrap="square" tIns="91425">
+            <a:noAutofit/>
+          </a:bodyPr>
+          <a:lstStyle/>
+          <a:p>
+            <a:pPr indent="0" lvl="0" marL="0" rtl="0" algn="l">
+              <a:spcBef>
+                <a:spcPts val="0"/>
+              </a:spcBef>
+              <a:spcAft>
+                <a:spcPts val="0"/>
+              </a:spcAft>
+              <a:buNone/>
+            </a:pPr>
+            <a:r>
+              <a:rPr lang="de"/>
+              <a:t>2. Backend</a:t>
+            </a:r>
+            <a:endParaRPr/>
+          </a:p>
+        </p:txBody>
+      </p:sp>
+      <p:sp>
+        <p:nvSpPr>
+          <p:cNvPr id="172" name="Google Shape;172;p24"/>
+          <p:cNvSpPr txBox="1"/>
+          <p:nvPr>
+            <p:ph idx="2" type="body"/>
+          </p:nvPr>
+        </p:nvSpPr>
+        <p:spPr>
+          <a:xfrm>
+            <a:off x="5174225" y="1352625"/>
+            <a:ext cx="3374400" cy="3025500"/>
+          </a:xfrm>
+          <a:prstGeom prst="rect">
+            <a:avLst/>
+          </a:prstGeom>
+        </p:spPr>
+        <p:txBody>
+          <a:bodyPr anchorCtr="0" anchor="t" bIns="91425" lIns="91425" spcFirstLastPara="1" rIns="91425" wrap="square" tIns="91425">
+            <a:noAutofit/>
+          </a:bodyPr>
+          <a:lstStyle/>
+          <a:p>
+            <a:pPr indent="0" lvl="0" marL="0" rtl="0" algn="l">
+              <a:spcBef>
+                <a:spcPts val="0"/>
+              </a:spcBef>
+              <a:spcAft>
+                <a:spcPts val="1600"/>
+              </a:spcAft>
+              <a:buNone/>
+            </a:pPr>
+            <a:r>
+              <a:rPr lang="de"/>
+              <a:t>Das von links als Liste nach hier? Oder doch lieber ein Bild??</a:t>
+            </a:r>
+            <a:br>
+              <a:rPr lang="de"/>
+            </a:br>
+            <a:br>
+              <a:rPr lang="de"/>
+            </a:br>
+            <a:r>
+              <a:rPr lang="de"/>
+              <a:t>Ist mir komplett egal ;)</a:t>
+            </a:r>
+            <a:endParaRPr/>
+          </a:p>
+        </p:txBody>
+      </p:sp>
+      <p:sp>
+        <p:nvSpPr>
+          <p:cNvPr id="173" name="Google Shape;173;p24"/>
+          <p:cNvSpPr txBox="1"/>
+          <p:nvPr>
+            <p:ph idx="1" type="subTitle"/>
+          </p:nvPr>
+        </p:nvSpPr>
+        <p:spPr>
+          <a:xfrm>
+            <a:off x="724950" y="3161525"/>
+            <a:ext cx="3300900" cy="759000"/>
+          </a:xfrm>
+          <a:prstGeom prst="rect">
+            <a:avLst/>
+          </a:prstGeom>
+        </p:spPr>
+        <p:txBody>
+          <a:bodyPr anchorCtr="0" anchor="t" bIns="91425" lIns="91425" spcFirstLastPara="1" rIns="91425" wrap="square" tIns="91425">
+            <a:noAutofit/>
+          </a:bodyPr>
+          <a:lstStyle/>
+          <a:p>
+            <a:pPr indent="0" lvl="0" marL="0" rtl="0" algn="l">
+              <a:spcBef>
+                <a:spcPts val="0"/>
+              </a:spcBef>
+              <a:spcAft>
+                <a:spcPts val="0"/>
+              </a:spcAft>
+              <a:buNone/>
+            </a:pPr>
+            <a:r>
+              <a:rPr lang="de"/>
+              <a:t>Datenmodell, Persistenz und App-Interaktion</a:t>
             </a:r>
             <a:endParaRPr/>
           </a:p>
@@ -9918,7 +10489,7 @@
   <p:cSld>
     <p:spTree>
       <p:nvGrpSpPr>
-        <p:cNvPr id="169" name="Shape 169"/>
+        <p:cNvPr id="177" name="Shape 177"/>
         <p:cNvGrpSpPr/>
         <p:nvPr/>
       </p:nvGrpSpPr>
@@ -9932,7 +10503,7 @@
       </p:grpSpPr>
       <p:sp>
         <p:nvSpPr>
-          <p:cNvPr id="170" name="Google Shape;170;p25"/>
+          <p:cNvPr id="178" name="Google Shape;178;p25"/>
           <p:cNvSpPr txBox="1"/>
           <p:nvPr>
             <p:ph type="title"/>
@@ -9964,7 +10535,7 @@
             </a:pPr>
             <a:r>
               <a:rPr lang="de"/>
-              <a:t>Frontend</a:t>
+              <a:t>Generelles</a:t>
             </a:r>
             <a:endParaRPr/>
           </a:p>
@@ -9972,7 +10543,7 @@
       </p:sp>
       <p:sp>
         <p:nvSpPr>
-          <p:cNvPr id="171" name="Google Shape;171;p25"/>
+          <p:cNvPr id="179" name="Google Shape;179;p25"/>
           <p:cNvSpPr txBox="1"/>
           <p:nvPr>
             <p:ph idx="1" type="body"/>
@@ -9993,17 +10564,138 @@
           </a:bodyPr>
           <a:lstStyle/>
           <a:p>
-            <a:pPr indent="0" lvl="0" marL="0" rtl="0" algn="l">
-              <a:spcBef>
-                <a:spcPts val="0"/>
-              </a:spcBef>
-              <a:spcAft>
-                <a:spcPts val="1600"/>
-              </a:spcAft>
-              <a:buNone/>
+            <a:pPr indent="-311150" lvl="0" marL="457200" rtl="0" algn="l">
+              <a:spcBef>
+                <a:spcPts val="0"/>
+              </a:spcBef>
+              <a:spcAft>
+                <a:spcPts val="0"/>
+              </a:spcAft>
+              <a:buSzPts val="1300"/>
+              <a:buChar char="●"/>
             </a:pPr>
             <a:r>
-              <a:t/>
+              <a:rPr lang="de"/>
+              <a:t>Technologie-Überblick</a:t>
+            </a:r>
+            <a:endParaRPr/>
+          </a:p>
+          <a:p>
+            <a:pPr indent="-298450" lvl="1" marL="914400" rtl="0" algn="l">
+              <a:spcBef>
+                <a:spcPts val="0"/>
+              </a:spcBef>
+              <a:spcAft>
+                <a:spcPts val="0"/>
+              </a:spcAft>
+              <a:buSzPts val="1100"/>
+              <a:buChar char="○"/>
+            </a:pPr>
+            <a:r>
+              <a:rPr lang="de"/>
+              <a:t>Spring Boot und Web</a:t>
+            </a:r>
+            <a:endParaRPr/>
+          </a:p>
+          <a:p>
+            <a:pPr indent="-298450" lvl="1" marL="914400" rtl="0" algn="l">
+              <a:spcBef>
+                <a:spcPts val="0"/>
+              </a:spcBef>
+              <a:spcAft>
+                <a:spcPts val="0"/>
+              </a:spcAft>
+              <a:buSzPts val="1100"/>
+              <a:buChar char="○"/>
+            </a:pPr>
+            <a:r>
+              <a:rPr lang="de"/>
+              <a:t>Hibernate</a:t>
+            </a:r>
+            <a:endParaRPr/>
+          </a:p>
+          <a:p>
+            <a:pPr indent="-298450" lvl="1" marL="914400" rtl="0" algn="l">
+              <a:spcBef>
+                <a:spcPts val="0"/>
+              </a:spcBef>
+              <a:spcAft>
+                <a:spcPts val="0"/>
+              </a:spcAft>
+              <a:buSzPts val="1100"/>
+              <a:buChar char="○"/>
+            </a:pPr>
+            <a:r>
+              <a:rPr lang="de"/>
+              <a:t>Zusammenspiel aller Technologien erklären</a:t>
+            </a:r>
+            <a:endParaRPr/>
+          </a:p>
+          <a:p>
+            <a:pPr indent="-298450" lvl="2" marL="1371600" rtl="0" algn="l">
+              <a:spcBef>
+                <a:spcPts val="0"/>
+              </a:spcBef>
+              <a:spcAft>
+                <a:spcPts val="0"/>
+              </a:spcAft>
+              <a:buSzPts val="1100"/>
+              <a:buChar char="■"/>
+            </a:pPr>
+            <a:r>
+              <a:rPr lang="de"/>
+              <a:t>Schichten des Backends</a:t>
+            </a:r>
+            <a:endParaRPr/>
+          </a:p>
+          <a:p>
+            <a:pPr indent="-298450" lvl="3" marL="1828800" rtl="0" algn="l">
+              <a:spcBef>
+                <a:spcPts val="0"/>
+              </a:spcBef>
+              <a:spcAft>
+                <a:spcPts val="0"/>
+              </a:spcAft>
+              <a:buSzPts val="1100"/>
+              <a:buChar char="●"/>
+            </a:pPr>
+            <a:r>
+              <a:rPr lang="de"/>
+              <a:t>Einfluss der Schichten</a:t>
+            </a:r>
+            <a:endParaRPr/>
+          </a:p>
+          <a:p>
+            <a:pPr indent="-298450" lvl="2" marL="1371600" rtl="0" algn="l">
+              <a:spcBef>
+                <a:spcPts val="0"/>
+              </a:spcBef>
+              <a:spcAft>
+                <a:spcPts val="0"/>
+              </a:spcAft>
+              <a:buSzPts val="1100"/>
+              <a:buChar char="■"/>
+            </a:pPr>
+            <a:r>
+              <a:rPr lang="de"/>
+              <a:t>Interaktion mit Frontend</a:t>
+            </a:r>
+            <a:endParaRPr/>
+          </a:p>
+          <a:p>
+            <a:pPr indent="-298450" lvl="2" marL="1371600" rtl="0" algn="l">
+              <a:spcBef>
+                <a:spcPts val="0"/>
+              </a:spcBef>
+              <a:spcAft>
+                <a:spcPts val="0"/>
+              </a:spcAft>
+              <a:buSzPts val="1100"/>
+              <a:buChar char="■"/>
+            </a:pPr>
+            <a:r>
+              <a:rPr lang="de"/>
+              <a:t>Hier mit Beispiel starten -&gt; Mehr und Mehr sachen erklären bzw. detaillieren</a:t>
             </a:r>
             <a:endParaRPr/>
           </a:p>
@@ -10022,7 +10714,7 @@
   <p:cSld>
     <p:spTree>
       <p:nvGrpSpPr>
-        <p:cNvPr id="175" name="Shape 175"/>
+        <p:cNvPr id="183" name="Shape 183"/>
         <p:cNvGrpSpPr/>
         <p:nvPr/>
       </p:nvGrpSpPr>
@@ -10036,7 +10728,7 @@
       </p:grpSpPr>
       <p:sp>
         <p:nvSpPr>
-          <p:cNvPr id="176" name="Google Shape;176;p26"/>
+          <p:cNvPr id="184" name="Google Shape;184;p26"/>
           <p:cNvSpPr txBox="1"/>
           <p:nvPr>
             <p:ph type="title"/>
@@ -10044,20 +10736,20 @@
         </p:nvSpPr>
         <p:spPr>
           <a:xfrm>
-            <a:off x="1061400" y="881050"/>
-            <a:ext cx="7021200" cy="2985000"/>
+            <a:off x="729450" y="1318650"/>
+            <a:ext cx="7688700" cy="535200"/>
           </a:xfrm>
           <a:prstGeom prst="rect">
             <a:avLst/>
           </a:prstGeom>
         </p:spPr>
         <p:txBody>
-          <a:bodyPr anchorCtr="0" anchor="ctr" bIns="91425" lIns="91425" spcFirstLastPara="1" rIns="91425" wrap="square" tIns="91425">
+          <a:bodyPr anchorCtr="0" anchor="t" bIns="91425" lIns="91425" spcFirstLastPara="1" rIns="91425" wrap="square" tIns="91425">
             <a:noAutofit/>
           </a:bodyPr>
           <a:lstStyle/>
           <a:p>
-            <a:pPr indent="0" lvl="0" marL="0" rtl="0" algn="ctr">
+            <a:pPr indent="0" lvl="0" marL="0" rtl="0" algn="l">
               <a:spcBef>
                 <a:spcPts val="0"/>
               </a:spcBef>
@@ -10068,7 +10760,116 @@
             </a:pPr>
             <a:r>
               <a:rPr lang="de"/>
-              <a:t>Live-Demo</a:t>
+              <a:t>Datenmodell</a:t>
+            </a:r>
+            <a:endParaRPr/>
+          </a:p>
+        </p:txBody>
+      </p:sp>
+      <p:sp>
+        <p:nvSpPr>
+          <p:cNvPr id="185" name="Google Shape;185;p26"/>
+          <p:cNvSpPr txBox="1"/>
+          <p:nvPr>
+            <p:ph idx="1" type="body"/>
+          </p:nvPr>
+        </p:nvSpPr>
+        <p:spPr>
+          <a:xfrm>
+            <a:off x="729450" y="2078875"/>
+            <a:ext cx="7688700" cy="2261100"/>
+          </a:xfrm>
+          <a:prstGeom prst="rect">
+            <a:avLst/>
+          </a:prstGeom>
+        </p:spPr>
+        <p:txBody>
+          <a:bodyPr anchorCtr="0" anchor="t" bIns="91425" lIns="91425" spcFirstLastPara="1" rIns="91425" wrap="square" tIns="91425">
+            <a:noAutofit/>
+          </a:bodyPr>
+          <a:lstStyle/>
+          <a:p>
+            <a:pPr indent="-311150" lvl="0" marL="457200" rtl="0" algn="l">
+              <a:spcBef>
+                <a:spcPts val="0"/>
+              </a:spcBef>
+              <a:spcAft>
+                <a:spcPts val="0"/>
+              </a:spcAft>
+              <a:buSzPts val="1300"/>
+              <a:buChar char="●"/>
+            </a:pPr>
+            <a:r>
+              <a:rPr lang="de"/>
+              <a:t>UML-Diagramme verwenden</a:t>
+            </a:r>
+            <a:endParaRPr/>
+          </a:p>
+          <a:p>
+            <a:pPr indent="-298450" lvl="1" marL="914400" rtl="0" algn="l">
+              <a:spcBef>
+                <a:spcPts val="0"/>
+              </a:spcBef>
+              <a:spcAft>
+                <a:spcPts val="0"/>
+              </a:spcAft>
+              <a:buSzPts val="1100"/>
+              <a:buChar char="○"/>
+            </a:pPr>
+            <a:r>
+              <a:rPr lang="de"/>
+              <a:t>an Dokument orientieren</a:t>
+            </a:r>
+            <a:endParaRPr/>
+          </a:p>
+          <a:p>
+            <a:pPr indent="-311150" lvl="0" marL="457200" rtl="0" algn="l">
+              <a:spcBef>
+                <a:spcPts val="0"/>
+              </a:spcBef>
+              <a:spcAft>
+                <a:spcPts val="0"/>
+              </a:spcAft>
+              <a:buSzPts val="1300"/>
+              <a:buChar char="●"/>
+            </a:pPr>
+            <a:r>
+              <a:rPr lang="de"/>
+              <a:t>Klassen und deren Nutzen erklären -&gt; Diagramme!</a:t>
+            </a:r>
+            <a:endParaRPr/>
+          </a:p>
+          <a:p>
+            <a:pPr indent="-298450" lvl="1" marL="914400" rtl="0" algn="l">
+              <a:spcBef>
+                <a:spcPts val="0"/>
+              </a:spcBef>
+              <a:spcAft>
+                <a:spcPts val="0"/>
+              </a:spcAft>
+              <a:buSzPts val="1100"/>
+              <a:buChar char="○"/>
+            </a:pPr>
+            <a:r>
+              <a:rPr lang="de"/>
+              <a:t>auf Probleme eingehen</a:t>
+            </a:r>
+            <a:endParaRPr/>
+          </a:p>
+          <a:p>
+            <a:pPr indent="-298450" lvl="2" marL="1371600" rtl="0" algn="l">
+              <a:spcBef>
+                <a:spcPts val="0"/>
+              </a:spcBef>
+              <a:spcAft>
+                <a:spcPts val="0"/>
+              </a:spcAft>
+              <a:buSzPts val="1100"/>
+              <a:buChar char="■"/>
+            </a:pPr>
+            <a:r>
+              <a:rPr lang="de"/>
+              <a:t>Maps</a:t>
             </a:r>
             <a:endParaRPr/>
           </a:p>
@@ -10087,7 +10888,7 @@
   <p:cSld>
     <p:spTree>
       <p:nvGrpSpPr>
-        <p:cNvPr id="180" name="Shape 180"/>
+        <p:cNvPr id="189" name="Shape 189"/>
         <p:cNvGrpSpPr/>
         <p:nvPr/>
       </p:nvGrpSpPr>
@@ -10101,16 +10902,16 @@
       </p:grpSpPr>
       <p:sp>
         <p:nvSpPr>
-          <p:cNvPr id="181" name="Google Shape;181;p27"/>
+          <p:cNvPr id="190" name="Google Shape;190;p27"/>
           <p:cNvSpPr txBox="1"/>
           <p:nvPr>
-            <p:ph type="ctrTitle"/>
+            <p:ph type="title"/>
           </p:nvPr>
         </p:nvSpPr>
         <p:spPr>
           <a:xfrm>
-            <a:off x="729450" y="1322450"/>
-            <a:ext cx="7688100" cy="1664700"/>
+            <a:off x="729450" y="1318650"/>
+            <a:ext cx="7688700" cy="535200"/>
           </a:xfrm>
           <a:prstGeom prst="rect">
             <a:avLst/>
@@ -10133,7 +10934,7 @@
             </a:pPr>
             <a:r>
               <a:rPr lang="de"/>
-              <a:t>Vielen Dank!</a:t>
+              <a:t>Persistenz</a:t>
             </a:r>
             <a:endParaRPr/>
           </a:p>
@@ -10141,16 +10942,16 @@
       </p:sp>
       <p:sp>
         <p:nvSpPr>
-          <p:cNvPr id="182" name="Google Shape;182;p27"/>
+          <p:cNvPr id="191" name="Google Shape;191;p27"/>
           <p:cNvSpPr txBox="1"/>
           <p:nvPr>
-            <p:ph idx="1" type="subTitle"/>
+            <p:ph idx="1" type="body"/>
           </p:nvPr>
         </p:nvSpPr>
         <p:spPr>
           <a:xfrm>
-            <a:off x="729627" y="3172900"/>
-            <a:ext cx="7688100" cy="541200"/>
+            <a:off x="729450" y="2078875"/>
+            <a:ext cx="7688700" cy="2261100"/>
           </a:xfrm>
           <a:prstGeom prst="rect">
             <a:avLst/>
@@ -10162,17 +10963,163 @@
           </a:bodyPr>
           <a:lstStyle/>
           <a:p>
-            <a:pPr indent="0" lvl="0" marL="0" rtl="0" algn="l">
-              <a:spcBef>
-                <a:spcPts val="0"/>
-              </a:spcBef>
-              <a:spcAft>
-                <a:spcPts val="0"/>
-              </a:spcAft>
-              <a:buNone/>
+            <a:pPr indent="-311150" lvl="0" marL="457200" rtl="0" algn="l">
+              <a:spcBef>
+                <a:spcPts val="0"/>
+              </a:spcBef>
+              <a:spcAft>
+                <a:spcPts val="0"/>
+              </a:spcAft>
+              <a:buSzPts val="1300"/>
+              <a:buChar char="●"/>
             </a:pPr>
             <a:r>
-              <a:t/>
+              <a:rPr lang="de"/>
+              <a:t>grobe Struktur erklären</a:t>
+            </a:r>
+            <a:endParaRPr/>
+          </a:p>
+          <a:p>
+            <a:pPr indent="-298450" lvl="1" marL="914400" rtl="0" algn="l">
+              <a:spcBef>
+                <a:spcPts val="0"/>
+              </a:spcBef>
+              <a:spcAft>
+                <a:spcPts val="0"/>
+              </a:spcAft>
+              <a:buSzPts val="1100"/>
+              <a:buChar char="○"/>
+            </a:pPr>
+            <a:r>
+              <a:rPr lang="de"/>
+              <a:t>Datenbank</a:t>
+            </a:r>
+            <a:endParaRPr/>
+          </a:p>
+          <a:p>
+            <a:pPr indent="-298450" lvl="2" marL="1371600" rtl="0" algn="l">
+              <a:spcBef>
+                <a:spcPts val="0"/>
+              </a:spcBef>
+              <a:spcAft>
+                <a:spcPts val="0"/>
+              </a:spcAft>
+              <a:buSzPts val="1100"/>
+              <a:buChar char="■"/>
+            </a:pPr>
+            <a:r>
+              <a:rPr lang="de"/>
+              <a:t>Portabilität hervorheben</a:t>
+            </a:r>
+            <a:endParaRPr/>
+          </a:p>
+          <a:p>
+            <a:pPr indent="-298450" lvl="1" marL="914400" rtl="0" algn="l">
+              <a:spcBef>
+                <a:spcPts val="0"/>
+              </a:spcBef>
+              <a:spcAft>
+                <a:spcPts val="0"/>
+              </a:spcAft>
+              <a:buSzPts val="1100"/>
+              <a:buChar char="○"/>
+            </a:pPr>
+            <a:r>
+              <a:rPr lang="de"/>
+              <a:t>Annotationen</a:t>
+            </a:r>
+            <a:endParaRPr/>
+          </a:p>
+          <a:p>
+            <a:pPr indent="-298450" lvl="2" marL="1371600" rtl="0" algn="l">
+              <a:spcBef>
+                <a:spcPts val="0"/>
+              </a:spcBef>
+              <a:spcAft>
+                <a:spcPts val="0"/>
+              </a:spcAft>
+              <a:buSzPts val="1100"/>
+              <a:buChar char="■"/>
+            </a:pPr>
+            <a:r>
+              <a:rPr lang="de"/>
+              <a:t>annotierte Klasse zeigen</a:t>
+            </a:r>
+            <a:endParaRPr/>
+          </a:p>
+          <a:p>
+            <a:pPr indent="-298450" lvl="1" marL="914400" rtl="0" algn="l">
+              <a:spcBef>
+                <a:spcPts val="0"/>
+              </a:spcBef>
+              <a:spcAft>
+                <a:spcPts val="0"/>
+              </a:spcAft>
+              <a:buSzPts val="1100"/>
+              <a:buChar char="○"/>
+            </a:pPr>
+            <a:r>
+              <a:rPr lang="de"/>
+              <a:t>Repositories</a:t>
+            </a:r>
+            <a:endParaRPr/>
+          </a:p>
+          <a:p>
+            <a:pPr indent="-311150" lvl="0" marL="457200" rtl="0" algn="l">
+              <a:spcBef>
+                <a:spcPts val="0"/>
+              </a:spcBef>
+              <a:spcAft>
+                <a:spcPts val="0"/>
+              </a:spcAft>
+              <a:buSzPts val="1300"/>
+              <a:buChar char="●"/>
+            </a:pPr>
+            <a:r>
+              <a:rPr lang="de"/>
+              <a:t>Speichern, </a:t>
+            </a:r>
+            <a:r>
+              <a:rPr lang="de"/>
+              <a:t>Aktualisieren </a:t>
+            </a:r>
+            <a:r>
+              <a:rPr lang="de"/>
+              <a:t>und Löschen an Beispiel durchgehen</a:t>
+            </a:r>
+            <a:endParaRPr/>
+          </a:p>
+          <a:p>
+            <a:pPr indent="-298450" lvl="1" marL="914400" rtl="0" algn="l">
+              <a:spcBef>
+                <a:spcPts val="0"/>
+              </a:spcBef>
+              <a:spcAft>
+                <a:spcPts val="0"/>
+              </a:spcAft>
+              <a:buSzPts val="1100"/>
+              <a:buChar char="○"/>
+            </a:pPr>
+            <a:r>
+              <a:rPr lang="de"/>
+              <a:t>Narrative aufbauen -&gt; Kunde oder Gericht?</a:t>
+            </a:r>
+            <a:endParaRPr/>
+          </a:p>
+          <a:p>
+            <a:pPr indent="-311150" lvl="0" marL="457200" rtl="0" algn="l">
+              <a:spcBef>
+                <a:spcPts val="0"/>
+              </a:spcBef>
+              <a:spcAft>
+                <a:spcPts val="0"/>
+              </a:spcAft>
+              <a:buSzPts val="1300"/>
+              <a:buChar char="●"/>
+            </a:pPr>
+            <a:r>
+              <a:rPr lang="de"/>
+              <a:t>Warum überhaupt machen?</a:t>
             </a:r>
             <a:endParaRPr/>
           </a:p>
@@ -10191,7 +11138,7 @@
   <p:cSld>
     <p:spTree>
       <p:nvGrpSpPr>
-        <p:cNvPr id="186" name="Shape 186"/>
+        <p:cNvPr id="195" name="Shape 195"/>
         <p:cNvGrpSpPr/>
         <p:nvPr/>
       </p:nvGrpSpPr>
@@ -10205,7 +11152,7 @@
       </p:grpSpPr>
       <p:sp>
         <p:nvSpPr>
-          <p:cNvPr id="187" name="Google Shape;187;p28"/>
+          <p:cNvPr id="196" name="Google Shape;196;p28"/>
           <p:cNvSpPr txBox="1"/>
           <p:nvPr>
             <p:ph type="title"/>
@@ -10237,7 +11184,7 @@
             </a:pPr>
             <a:r>
               <a:rPr lang="de"/>
-              <a:t>Quellen</a:t>
+              <a:t>Interaktion mit der App	</a:t>
             </a:r>
             <a:endParaRPr/>
           </a:p>
@@ -10245,7 +11192,7 @@
       </p:sp>
       <p:sp>
         <p:nvSpPr>
-          <p:cNvPr id="188" name="Google Shape;188;p28"/>
+          <p:cNvPr id="197" name="Google Shape;197;p28"/>
           <p:cNvSpPr txBox="1"/>
           <p:nvPr>
             <p:ph idx="1" type="body"/>
@@ -10255,6 +11202,191 @@
           <a:xfrm>
             <a:off x="729450" y="2078875"/>
             <a:ext cx="7688700" cy="2261100"/>
+          </a:xfrm>
+          <a:prstGeom prst="rect">
+            <a:avLst/>
+          </a:prstGeom>
+        </p:spPr>
+        <p:txBody>
+          <a:bodyPr anchorCtr="0" anchor="t" bIns="91425" lIns="91425" spcFirstLastPara="1" rIns="91425" wrap="square" tIns="91425">
+            <a:noAutofit/>
+          </a:bodyPr>
+          <a:lstStyle/>
+          <a:p>
+            <a:pPr indent="-311150" lvl="0" marL="457200" rtl="0" algn="l">
+              <a:spcBef>
+                <a:spcPts val="0"/>
+              </a:spcBef>
+              <a:spcAft>
+                <a:spcPts val="0"/>
+              </a:spcAft>
+              <a:buSzPts val="1300"/>
+              <a:buChar char="●"/>
+            </a:pPr>
+            <a:r>
+              <a:rPr lang="de"/>
+              <a:t>Zwei Bereiche:</a:t>
+            </a:r>
+            <a:endParaRPr/>
+          </a:p>
+          <a:p>
+            <a:pPr indent="-298450" lvl="1" marL="914400" rtl="0" algn="l">
+              <a:spcBef>
+                <a:spcPts val="0"/>
+              </a:spcBef>
+              <a:spcAft>
+                <a:spcPts val="0"/>
+              </a:spcAft>
+              <a:buSzPts val="1100"/>
+              <a:buChar char="○"/>
+            </a:pPr>
+            <a:r>
+              <a:rPr lang="de"/>
+              <a:t>DTO</a:t>
+            </a:r>
+            <a:endParaRPr/>
+          </a:p>
+          <a:p>
+            <a:pPr indent="-298450" lvl="1" marL="914400" rtl="0" algn="l">
+              <a:spcBef>
+                <a:spcPts val="0"/>
+              </a:spcBef>
+              <a:spcAft>
+                <a:spcPts val="0"/>
+              </a:spcAft>
+              <a:buSzPts val="1100"/>
+              <a:buChar char="○"/>
+            </a:pPr>
+            <a:r>
+              <a:rPr lang="de"/>
+              <a:t>REST</a:t>
+            </a:r>
+            <a:endParaRPr/>
+          </a:p>
+          <a:p>
+            <a:pPr indent="-298450" lvl="2" marL="1371600" rtl="0" algn="l">
+              <a:spcBef>
+                <a:spcPts val="0"/>
+              </a:spcBef>
+              <a:spcAft>
+                <a:spcPts val="0"/>
+              </a:spcAft>
+              <a:buSzPts val="1100"/>
+              <a:buChar char="■"/>
+            </a:pPr>
+            <a:r>
+              <a:rPr lang="de"/>
+              <a:t>beide Begriffe kurz erklären -&gt; Nutzen, etc.</a:t>
+            </a:r>
+            <a:endParaRPr/>
+          </a:p>
+          <a:p>
+            <a:pPr indent="-311150" lvl="0" marL="457200" rtl="0" algn="l">
+              <a:spcBef>
+                <a:spcPts val="0"/>
+              </a:spcBef>
+              <a:spcAft>
+                <a:spcPts val="0"/>
+              </a:spcAft>
+              <a:buSzPts val="1300"/>
+              <a:buChar char="●"/>
+            </a:pPr>
+            <a:r>
+              <a:rPr lang="de"/>
+              <a:t>Beispielsweise mit GET, POST und DELETE durchgehen</a:t>
+            </a:r>
+            <a:endParaRPr/>
+          </a:p>
+          <a:p>
+            <a:pPr indent="-298450" lvl="1" marL="914400" rtl="0" algn="l">
+              <a:spcBef>
+                <a:spcPts val="0"/>
+              </a:spcBef>
+              <a:spcAft>
+                <a:spcPts val="0"/>
+              </a:spcAft>
+              <a:buSzPts val="1100"/>
+              <a:buChar char="○"/>
+            </a:pPr>
+            <a:r>
+              <a:rPr lang="de"/>
+              <a:t>auf dem Persistenz-Beispiel aufbauen</a:t>
+            </a:r>
+            <a:endParaRPr/>
+          </a:p>
+          <a:p>
+            <a:pPr indent="-311150" lvl="0" marL="457200" rtl="0" algn="l">
+              <a:spcBef>
+                <a:spcPts val="0"/>
+              </a:spcBef>
+              <a:spcAft>
+                <a:spcPts val="0"/>
+              </a:spcAft>
+              <a:buSzPts val="1300"/>
+              <a:buChar char="●"/>
+            </a:pPr>
+            <a:r>
+              <a:rPr lang="de"/>
+              <a:t>Probleme hervorheben</a:t>
+            </a:r>
+            <a:endParaRPr/>
+          </a:p>
+          <a:p>
+            <a:pPr indent="-298450" lvl="1" marL="914400" rtl="0" algn="l">
+              <a:spcBef>
+                <a:spcPts val="0"/>
+              </a:spcBef>
+              <a:spcAft>
+                <a:spcPts val="0"/>
+              </a:spcAft>
+              <a:buSzPts val="1100"/>
+              <a:buChar char="○"/>
+            </a:pPr>
+            <a:r>
+              <a:rPr lang="de"/>
+              <a:t>GSON &lt;-&gt; Spring Web</a:t>
+            </a:r>
+            <a:endParaRPr/>
+          </a:p>
+        </p:txBody>
+      </p:sp>
+    </p:spTree>
+  </p:cSld>
+  <p:clrMapOvr>
+    <a:masterClrMapping/>
+  </p:clrMapOvr>
+</p:sld>
+</file>
+
+<file path=ppt/slides/slide16.xml><?xml version="1.0" encoding="utf-8"?>
+<p:sld xmlns:a="http://schemas.openxmlformats.org/drawingml/2006/main" xmlns:r="http://schemas.openxmlformats.org/officeDocument/2006/relationships" xmlns:mc="http://schemas.openxmlformats.org/markup-compatibility/2006" xmlns:mv="urn:schemas-microsoft-com:mac:vml" xmlns:p="http://schemas.openxmlformats.org/presentationml/2006/main" xmlns:c="http://schemas.openxmlformats.org/drawingml/2006/chart" xmlns:dgm="http://schemas.openxmlformats.org/drawingml/2006/diagram" xmlns:o="urn:schemas-microsoft-com:office:office" xmlns:v="urn:schemas-microsoft-com:vml" xmlns:pvml="urn:schemas-microsoft-com:office:powerpoint" xmlns:com="http://schemas.openxmlformats.org/drawingml/2006/compatibility" xmlns:p14="http://schemas.microsoft.com/office/powerpoint/2010/main" xmlns:p15="http://schemas.microsoft.com/office/powerpoint/2012/main">
+  <p:cSld>
+    <p:spTree>
+      <p:nvGrpSpPr>
+        <p:cNvPr id="201" name="Shape 201"/>
+        <p:cNvGrpSpPr/>
+        <p:nvPr/>
+      </p:nvGrpSpPr>
+      <p:grpSpPr>
+        <a:xfrm>
+          <a:off x="0" y="0"/>
+          <a:ext cx="0" cy="0"/>
+          <a:chOff x="0" y="0"/>
+          <a:chExt cx="0" cy="0"/>
+        </a:xfrm>
+      </p:grpSpPr>
+      <p:sp>
+        <p:nvSpPr>
+          <p:cNvPr id="202" name="Google Shape;202;p29"/>
+          <p:cNvSpPr txBox="1"/>
+          <p:nvPr>
+            <p:ph type="title"/>
+          </p:nvPr>
+        </p:nvSpPr>
+        <p:spPr>
+          <a:xfrm>
+            <a:off x="730000" y="1318650"/>
+            <a:ext cx="3300900" cy="1687200"/>
           </a:xfrm>
           <a:prstGeom prst="rect">
             <a:avLst/>
@@ -10271,7 +11403,359 @@
                 <a:spcPts val="0"/>
               </a:spcBef>
               <a:spcAft>
+                <a:spcPts val="0"/>
+              </a:spcAft>
+              <a:buNone/>
+            </a:pPr>
+            <a:r>
+              <a:rPr lang="de"/>
+              <a:t>3. Ergebnis</a:t>
+            </a:r>
+            <a:endParaRPr/>
+          </a:p>
+        </p:txBody>
+      </p:sp>
+      <p:sp>
+        <p:nvSpPr>
+          <p:cNvPr id="203" name="Google Shape;203;p29"/>
+          <p:cNvSpPr txBox="1"/>
+          <p:nvPr>
+            <p:ph idx="2" type="body"/>
+          </p:nvPr>
+        </p:nvSpPr>
+        <p:spPr>
+          <a:xfrm>
+            <a:off x="5174225" y="1352625"/>
+            <a:ext cx="3374400" cy="3025500"/>
+          </a:xfrm>
+          <a:prstGeom prst="rect">
+            <a:avLst/>
+          </a:prstGeom>
+        </p:spPr>
+        <p:txBody>
+          <a:bodyPr anchorCtr="0" anchor="t" bIns="91425" lIns="91425" spcFirstLastPara="1" rIns="91425" wrap="square" tIns="91425">
+            <a:noAutofit/>
+          </a:bodyPr>
+          <a:lstStyle/>
+          <a:p>
+            <a:pPr indent="0" lvl="0" marL="0" rtl="0" algn="l">
+              <a:spcBef>
+                <a:spcPts val="0"/>
+              </a:spcBef>
+              <a:spcAft>
                 <a:spcPts val="1600"/>
+              </a:spcAft>
+              <a:buNone/>
+            </a:pPr>
+            <a:r>
+              <a:t/>
+            </a:r>
+            <a:endParaRPr/>
+          </a:p>
+        </p:txBody>
+      </p:sp>
+      <p:sp>
+        <p:nvSpPr>
+          <p:cNvPr id="204" name="Google Shape;204;p29"/>
+          <p:cNvSpPr txBox="1"/>
+          <p:nvPr>
+            <p:ph idx="1" type="subTitle"/>
+          </p:nvPr>
+        </p:nvSpPr>
+        <p:spPr>
+          <a:xfrm>
+            <a:off x="724950" y="3161525"/>
+            <a:ext cx="3300900" cy="759000"/>
+          </a:xfrm>
+          <a:prstGeom prst="rect">
+            <a:avLst/>
+          </a:prstGeom>
+        </p:spPr>
+        <p:txBody>
+          <a:bodyPr anchorCtr="0" anchor="t" bIns="91425" lIns="91425" spcFirstLastPara="1" rIns="91425" wrap="square" tIns="91425">
+            <a:noAutofit/>
+          </a:bodyPr>
+          <a:lstStyle/>
+          <a:p>
+            <a:pPr indent="0" lvl="0" marL="0" rtl="0" algn="l">
+              <a:spcBef>
+                <a:spcPts val="0"/>
+              </a:spcBef>
+              <a:spcAft>
+                <a:spcPts val="0"/>
+              </a:spcAft>
+              <a:buNone/>
+            </a:pPr>
+            <a:r>
+              <a:t/>
+            </a:r>
+            <a:endParaRPr/>
+          </a:p>
+        </p:txBody>
+      </p:sp>
+    </p:spTree>
+  </p:cSld>
+  <p:clrMapOvr>
+    <a:masterClrMapping/>
+  </p:clrMapOvr>
+</p:sld>
+</file>
+
+<file path=ppt/slides/slide17.xml><?xml version="1.0" encoding="utf-8"?>
+<p:sld xmlns:a="http://schemas.openxmlformats.org/drawingml/2006/main" xmlns:r="http://schemas.openxmlformats.org/officeDocument/2006/relationships" xmlns:mc="http://schemas.openxmlformats.org/markup-compatibility/2006" xmlns:mv="urn:schemas-microsoft-com:mac:vml" xmlns:p="http://schemas.openxmlformats.org/presentationml/2006/main" xmlns:c="http://schemas.openxmlformats.org/drawingml/2006/chart" xmlns:dgm="http://schemas.openxmlformats.org/drawingml/2006/diagram" xmlns:o="urn:schemas-microsoft-com:office:office" xmlns:v="urn:schemas-microsoft-com:vml" xmlns:pvml="urn:schemas-microsoft-com:office:powerpoint" xmlns:com="http://schemas.openxmlformats.org/drawingml/2006/compatibility" xmlns:p14="http://schemas.microsoft.com/office/powerpoint/2010/main" xmlns:p15="http://schemas.microsoft.com/office/powerpoint/2012/main">
+  <p:cSld>
+    <p:spTree>
+      <p:nvGrpSpPr>
+        <p:cNvPr id="208" name="Shape 208"/>
+        <p:cNvGrpSpPr/>
+        <p:nvPr/>
+      </p:nvGrpSpPr>
+      <p:grpSpPr>
+        <a:xfrm>
+          <a:off x="0" y="0"/>
+          <a:ext cx="0" cy="0"/>
+          <a:chOff x="0" y="0"/>
+          <a:chExt cx="0" cy="0"/>
+        </a:xfrm>
+      </p:grpSpPr>
+      <p:sp>
+        <p:nvSpPr>
+          <p:cNvPr id="209" name="Google Shape;209;p30"/>
+          <p:cNvSpPr txBox="1"/>
+          <p:nvPr>
+            <p:ph type="title"/>
+          </p:nvPr>
+        </p:nvSpPr>
+        <p:spPr>
+          <a:xfrm>
+            <a:off x="729450" y="1318650"/>
+            <a:ext cx="7688700" cy="535200"/>
+          </a:xfrm>
+          <a:prstGeom prst="rect">
+            <a:avLst/>
+          </a:prstGeom>
+        </p:spPr>
+        <p:txBody>
+          <a:bodyPr anchorCtr="0" anchor="t" bIns="91425" lIns="91425" spcFirstLastPara="1" rIns="91425" wrap="square" tIns="91425">
+            <a:noAutofit/>
+          </a:bodyPr>
+          <a:lstStyle/>
+          <a:p>
+            <a:pPr indent="0" lvl="0" marL="0" rtl="0" algn="l">
+              <a:spcBef>
+                <a:spcPts val="0"/>
+              </a:spcBef>
+              <a:spcAft>
+                <a:spcPts val="0"/>
+              </a:spcAft>
+              <a:buNone/>
+            </a:pPr>
+            <a:r>
+              <a:rPr lang="de"/>
+              <a:t>Frontend</a:t>
+            </a:r>
+            <a:endParaRPr/>
+          </a:p>
+        </p:txBody>
+      </p:sp>
+      <p:sp>
+        <p:nvSpPr>
+          <p:cNvPr id="210" name="Google Shape;210;p30"/>
+          <p:cNvSpPr txBox="1"/>
+          <p:nvPr>
+            <p:ph idx="1" type="body"/>
+          </p:nvPr>
+        </p:nvSpPr>
+        <p:spPr>
+          <a:xfrm>
+            <a:off x="729450" y="2078875"/>
+            <a:ext cx="7688700" cy="2261100"/>
+          </a:xfrm>
+          <a:prstGeom prst="rect">
+            <a:avLst/>
+          </a:prstGeom>
+        </p:spPr>
+        <p:txBody>
+          <a:bodyPr anchorCtr="0" anchor="t" bIns="91425" lIns="91425" spcFirstLastPara="1" rIns="91425" wrap="square" tIns="91425">
+            <a:noAutofit/>
+          </a:bodyPr>
+          <a:lstStyle/>
+          <a:p>
+            <a:pPr indent="0" lvl="0" marL="0" rtl="0" algn="l">
+              <a:spcBef>
+                <a:spcPts val="0"/>
+              </a:spcBef>
+              <a:spcAft>
+                <a:spcPts val="1600"/>
+              </a:spcAft>
+              <a:buNone/>
+            </a:pPr>
+            <a:r>
+              <a:t/>
+            </a:r>
+            <a:endParaRPr/>
+          </a:p>
+        </p:txBody>
+      </p:sp>
+    </p:spTree>
+  </p:cSld>
+  <p:clrMapOvr>
+    <a:masterClrMapping/>
+  </p:clrMapOvr>
+</p:sld>
+</file>
+
+<file path=ppt/slides/slide18.xml><?xml version="1.0" encoding="utf-8"?>
+<p:sld xmlns:a="http://schemas.openxmlformats.org/drawingml/2006/main" xmlns:r="http://schemas.openxmlformats.org/officeDocument/2006/relationships" xmlns:mc="http://schemas.openxmlformats.org/markup-compatibility/2006" xmlns:mv="urn:schemas-microsoft-com:mac:vml" xmlns:p="http://schemas.openxmlformats.org/presentationml/2006/main" xmlns:c="http://schemas.openxmlformats.org/drawingml/2006/chart" xmlns:dgm="http://schemas.openxmlformats.org/drawingml/2006/diagram" xmlns:o="urn:schemas-microsoft-com:office:office" xmlns:v="urn:schemas-microsoft-com:vml" xmlns:pvml="urn:schemas-microsoft-com:office:powerpoint" xmlns:com="http://schemas.openxmlformats.org/drawingml/2006/compatibility" xmlns:p14="http://schemas.microsoft.com/office/powerpoint/2010/main" xmlns:p15="http://schemas.microsoft.com/office/powerpoint/2012/main">
+  <p:cSld>
+    <p:spTree>
+      <p:nvGrpSpPr>
+        <p:cNvPr id="214" name="Shape 214"/>
+        <p:cNvGrpSpPr/>
+        <p:nvPr/>
+      </p:nvGrpSpPr>
+      <p:grpSpPr>
+        <a:xfrm>
+          <a:off x="0" y="0"/>
+          <a:ext cx="0" cy="0"/>
+          <a:chOff x="0" y="0"/>
+          <a:chExt cx="0" cy="0"/>
+        </a:xfrm>
+      </p:grpSpPr>
+      <p:sp>
+        <p:nvSpPr>
+          <p:cNvPr id="215" name="Google Shape;215;p31"/>
+          <p:cNvSpPr txBox="1"/>
+          <p:nvPr>
+            <p:ph type="title"/>
+          </p:nvPr>
+        </p:nvSpPr>
+        <p:spPr>
+          <a:xfrm>
+            <a:off x="1061400" y="881050"/>
+            <a:ext cx="7021200" cy="2985000"/>
+          </a:xfrm>
+          <a:prstGeom prst="rect">
+            <a:avLst/>
+          </a:prstGeom>
+        </p:spPr>
+        <p:txBody>
+          <a:bodyPr anchorCtr="0" anchor="ctr" bIns="91425" lIns="91425" spcFirstLastPara="1" rIns="91425" wrap="square" tIns="91425">
+            <a:noAutofit/>
+          </a:bodyPr>
+          <a:lstStyle/>
+          <a:p>
+            <a:pPr indent="0" lvl="0" marL="0" rtl="0" algn="ctr">
+              <a:spcBef>
+                <a:spcPts val="0"/>
+              </a:spcBef>
+              <a:spcAft>
+                <a:spcPts val="0"/>
+              </a:spcAft>
+              <a:buNone/>
+            </a:pPr>
+            <a:r>
+              <a:rPr lang="de"/>
+              <a:t>Live-Demo</a:t>
+            </a:r>
+            <a:endParaRPr/>
+          </a:p>
+        </p:txBody>
+      </p:sp>
+    </p:spTree>
+  </p:cSld>
+  <p:clrMapOvr>
+    <a:masterClrMapping/>
+  </p:clrMapOvr>
+</p:sld>
+</file>
+
+<file path=ppt/slides/slide19.xml><?xml version="1.0" encoding="utf-8"?>
+<p:sld xmlns:a="http://schemas.openxmlformats.org/drawingml/2006/main" xmlns:r="http://schemas.openxmlformats.org/officeDocument/2006/relationships" xmlns:mc="http://schemas.openxmlformats.org/markup-compatibility/2006" xmlns:mv="urn:schemas-microsoft-com:mac:vml" xmlns:p="http://schemas.openxmlformats.org/presentationml/2006/main" xmlns:c="http://schemas.openxmlformats.org/drawingml/2006/chart" xmlns:dgm="http://schemas.openxmlformats.org/drawingml/2006/diagram" xmlns:o="urn:schemas-microsoft-com:office:office" xmlns:v="urn:schemas-microsoft-com:vml" xmlns:pvml="urn:schemas-microsoft-com:office:powerpoint" xmlns:com="http://schemas.openxmlformats.org/drawingml/2006/compatibility" xmlns:p14="http://schemas.microsoft.com/office/powerpoint/2010/main" xmlns:p15="http://schemas.microsoft.com/office/powerpoint/2012/main">
+  <p:cSld>
+    <p:spTree>
+      <p:nvGrpSpPr>
+        <p:cNvPr id="219" name="Shape 219"/>
+        <p:cNvGrpSpPr/>
+        <p:nvPr/>
+      </p:nvGrpSpPr>
+      <p:grpSpPr>
+        <a:xfrm>
+          <a:off x="0" y="0"/>
+          <a:ext cx="0" cy="0"/>
+          <a:chOff x="0" y="0"/>
+          <a:chExt cx="0" cy="0"/>
+        </a:xfrm>
+      </p:grpSpPr>
+      <p:sp>
+        <p:nvSpPr>
+          <p:cNvPr id="220" name="Google Shape;220;p32"/>
+          <p:cNvSpPr txBox="1"/>
+          <p:nvPr>
+            <p:ph type="ctrTitle"/>
+          </p:nvPr>
+        </p:nvSpPr>
+        <p:spPr>
+          <a:xfrm>
+            <a:off x="729450" y="1322450"/>
+            <a:ext cx="7688100" cy="1664700"/>
+          </a:xfrm>
+          <a:prstGeom prst="rect">
+            <a:avLst/>
+          </a:prstGeom>
+        </p:spPr>
+        <p:txBody>
+          <a:bodyPr anchorCtr="0" anchor="t" bIns="91425" lIns="91425" spcFirstLastPara="1" rIns="91425" wrap="square" tIns="91425">
+            <a:noAutofit/>
+          </a:bodyPr>
+          <a:lstStyle/>
+          <a:p>
+            <a:pPr indent="0" lvl="0" marL="0" rtl="0" algn="l">
+              <a:spcBef>
+                <a:spcPts val="0"/>
+              </a:spcBef>
+              <a:spcAft>
+                <a:spcPts val="0"/>
+              </a:spcAft>
+              <a:buNone/>
+            </a:pPr>
+            <a:r>
+              <a:rPr lang="de"/>
+              <a:t>Vielen Dank!</a:t>
+            </a:r>
+            <a:endParaRPr/>
+          </a:p>
+        </p:txBody>
+      </p:sp>
+      <p:sp>
+        <p:nvSpPr>
+          <p:cNvPr id="221" name="Google Shape;221;p32"/>
+          <p:cNvSpPr txBox="1"/>
+          <p:nvPr>
+            <p:ph idx="1" type="subTitle"/>
+          </p:nvPr>
+        </p:nvSpPr>
+        <p:spPr>
+          <a:xfrm>
+            <a:off x="729627" y="3172900"/>
+            <a:ext cx="7688100" cy="541200"/>
+          </a:xfrm>
+          <a:prstGeom prst="rect">
+            <a:avLst/>
+          </a:prstGeom>
+        </p:spPr>
+        <p:txBody>
+          <a:bodyPr anchorCtr="0" anchor="t" bIns="91425" lIns="91425" spcFirstLastPara="1" rIns="91425" wrap="square" tIns="91425">
+            <a:noAutofit/>
+          </a:bodyPr>
+          <a:lstStyle/>
+          <a:p>
+            <a:pPr indent="0" lvl="0" marL="0" rtl="0" algn="l">
+              <a:spcBef>
+                <a:spcPts val="0"/>
+              </a:spcBef>
+              <a:spcAft>
+                <a:spcPts val="0"/>
               </a:spcAft>
               <a:buNone/>
             </a:pPr>
@@ -10460,14 +11944,46 @@
             <a:r>
               <a:rPr lang="de" sz="1300">
                 <a:solidFill>
-                  <a:srgbClr val="FFFFFF"/>
+                  <a:schemeClr val="lt1"/>
                 </a:solidFill>
                 <a:latin typeface="Raleway"/>
                 <a:ea typeface="Raleway"/>
                 <a:cs typeface="Raleway"/>
                 <a:sym typeface="Raleway"/>
               </a:rPr>
-              <a:t>Annahmen</a:t>
+              <a:t>Herangehensweise</a:t>
+            </a:r>
+            <a:endParaRPr sz="1300">
+              <a:solidFill>
+                <a:schemeClr val="lt1"/>
+              </a:solidFill>
+              <a:latin typeface="Raleway"/>
+              <a:ea typeface="Raleway"/>
+              <a:cs typeface="Raleway"/>
+              <a:sym typeface="Raleway"/>
+            </a:endParaRPr>
+          </a:p>
+          <a:p>
+            <a:pPr indent="0" lvl="0" marL="0" rtl="0" algn="l">
+              <a:spcBef>
+                <a:spcPts val="1600"/>
+              </a:spcBef>
+              <a:spcAft>
+                <a:spcPts val="0"/>
+              </a:spcAft>
+              <a:buNone/>
+            </a:pPr>
+            <a:r>
+              <a:rPr lang="de" sz="1300">
+                <a:solidFill>
+                  <a:srgbClr val="FFFFFF"/>
+                </a:solidFill>
+                <a:latin typeface="Raleway"/>
+                <a:ea typeface="Raleway"/>
+                <a:cs typeface="Raleway"/>
+                <a:sym typeface="Raleway"/>
+              </a:rPr>
+              <a:t>Anforderungen</a:t>
             </a:r>
             <a:endParaRPr sz="1300">
               <a:solidFill>
@@ -10482,7 +11998,30 @@
           <a:p>
             <a:pPr indent="0" lvl="0" marL="0" rtl="0" algn="l">
               <a:spcBef>
-                <a:spcPts val="1600"/>
+                <a:spcPts val="0"/>
+              </a:spcBef>
+              <a:spcAft>
+                <a:spcPts val="0"/>
+              </a:spcAft>
+              <a:buNone/>
+            </a:pPr>
+            <a:r>
+              <a:t/>
+            </a:r>
+            <a:endParaRPr sz="1300">
+              <a:solidFill>
+                <a:srgbClr val="FFFFFF"/>
+              </a:solidFill>
+              <a:latin typeface="Raleway"/>
+              <a:ea typeface="Raleway"/>
+              <a:cs typeface="Raleway"/>
+              <a:sym typeface="Raleway"/>
+            </a:endParaRPr>
+          </a:p>
+          <a:p>
+            <a:pPr indent="0" lvl="0" marL="0" rtl="0" algn="l">
+              <a:spcBef>
+                <a:spcPts val="0"/>
               </a:spcBef>
               <a:spcAft>
                 <a:spcPts val="0"/>
@@ -10499,7 +12038,7 @@
                 <a:cs typeface="Raleway"/>
                 <a:sym typeface="Raleway"/>
               </a:rPr>
-              <a:t>Anforderungen</a:t>
+              <a:t>Sitemap</a:t>
             </a:r>
             <a:endParaRPr sz="1300">
               <a:solidFill>
@@ -10580,7 +12119,19 @@
                 <a:cs typeface="Raleway"/>
                 <a:sym typeface="Raleway"/>
               </a:rPr>
-              <a:t>2. Umsetzung</a:t>
+              <a:t>2. </a:t>
+            </a:r>
+            <a:r>
+              <a:rPr b="1" lang="de" sz="1600">
+                <a:solidFill>
+                  <a:srgbClr val="FFFFFF"/>
+                </a:solidFill>
+                <a:latin typeface="Raleway"/>
+                <a:ea typeface="Raleway"/>
+                <a:cs typeface="Raleway"/>
+                <a:sym typeface="Raleway"/>
+              </a:rPr>
+              <a:t>Backend</a:t>
             </a:r>
             <a:endParaRPr b="1" sz="1600">
               <a:solidFill>
@@ -10612,7 +12163,7 @@
                 <a:cs typeface="Raleway"/>
                 <a:sym typeface="Raleway"/>
               </a:rPr>
-              <a:t>Herangehensweise</a:t>
+              <a:t>Datenmodell</a:t>
             </a:r>
             <a:endParaRPr sz="1300">
               <a:solidFill>
@@ -10627,7 +12178,30 @@
           <a:p>
             <a:pPr indent="0" lvl="0" marL="0" rtl="0" algn="l">
               <a:spcBef>
-                <a:spcPts val="1600"/>
+                <a:spcPts val="0"/>
+              </a:spcBef>
+              <a:spcAft>
+                <a:spcPts val="0"/>
+              </a:spcAft>
+              <a:buNone/>
+            </a:pPr>
+            <a:r>
+              <a:t/>
+            </a:r>
+            <a:endParaRPr sz="1300">
+              <a:solidFill>
+                <a:srgbClr val="FFFFFF"/>
+              </a:solidFill>
+              <a:latin typeface="Raleway"/>
+              <a:ea typeface="Raleway"/>
+              <a:cs typeface="Raleway"/>
+              <a:sym typeface="Raleway"/>
+            </a:endParaRPr>
+          </a:p>
+          <a:p>
+            <a:pPr indent="0" lvl="0" marL="0" rtl="0" algn="l">
+              <a:spcBef>
+                <a:spcPts val="0"/>
               </a:spcBef>
               <a:spcAft>
                 <a:spcPts val="0"/>
@@ -10644,7 +12218,62 @@
                 <a:cs typeface="Raleway"/>
                 <a:sym typeface="Raleway"/>
               </a:rPr>
-              <a:t>Architektur</a:t>
+              <a:t>Persistenz</a:t>
+            </a:r>
+            <a:endParaRPr sz="1300">
+              <a:solidFill>
+                <a:srgbClr val="FFFFFF"/>
+              </a:solidFill>
+              <a:latin typeface="Raleway"/>
+              <a:ea typeface="Raleway"/>
+              <a:cs typeface="Raleway"/>
+              <a:sym typeface="Raleway"/>
+            </a:endParaRPr>
+          </a:p>
+          <a:p>
+            <a:pPr indent="0" lvl="0" marL="0" rtl="0" algn="l">
+              <a:spcBef>
+                <a:spcPts val="0"/>
+              </a:spcBef>
+              <a:spcAft>
+                <a:spcPts val="0"/>
+              </a:spcAft>
+              <a:buNone/>
+            </a:pPr>
+            <a:r>
+              <a:t/>
+            </a:r>
+            <a:endParaRPr sz="1300">
+              <a:solidFill>
+                <a:srgbClr val="FFFFFF"/>
+              </a:solidFill>
+              <a:latin typeface="Raleway"/>
+              <a:ea typeface="Raleway"/>
+              <a:cs typeface="Raleway"/>
+              <a:sym typeface="Raleway"/>
+            </a:endParaRPr>
+          </a:p>
+          <a:p>
+            <a:pPr indent="0" lvl="0" marL="0" rtl="0" algn="l">
+              <a:spcBef>
+                <a:spcPts val="0"/>
+              </a:spcBef>
+              <a:spcAft>
+                <a:spcPts val="0"/>
+              </a:spcAft>
+              <a:buNone/>
+            </a:pPr>
+            <a:r>
+              <a:rPr lang="de" sz="1300">
+                <a:solidFill>
+                  <a:srgbClr val="FFFFFF"/>
+                </a:solidFill>
+                <a:latin typeface="Raleway"/>
+                <a:ea typeface="Raleway"/>
+                <a:cs typeface="Raleway"/>
+                <a:sym typeface="Raleway"/>
+              </a:rPr>
+              <a:t>Interaktion mit der App</a:t>
             </a:r>
             <a:endParaRPr sz="1300">
               <a:solidFill>
@@ -10702,7 +12331,19 @@
                 <a:cs typeface="Raleway"/>
                 <a:sym typeface="Raleway"/>
               </a:rPr>
-              <a:t>3. Ergebnis</a:t>
+              <a:t>3. </a:t>
+            </a:r>
+            <a:r>
+              <a:rPr b="1" lang="de" sz="1600">
+                <a:solidFill>
+                  <a:srgbClr val="FFFFFF"/>
+                </a:solidFill>
+                <a:latin typeface="Raleway"/>
+                <a:ea typeface="Raleway"/>
+                <a:cs typeface="Raleway"/>
+                <a:sym typeface="Raleway"/>
+              </a:rPr>
+              <a:t>Frontend</a:t>
             </a:r>
             <a:endParaRPr b="1" sz="1600">
               <a:solidFill>
@@ -10809,6 +12450,110 @@
               <a:cs typeface="Raleway"/>
               <a:sym typeface="Raleway"/>
             </a:endParaRPr>
+          </a:p>
+        </p:txBody>
+      </p:sp>
+    </p:spTree>
+  </p:cSld>
+  <p:clrMapOvr>
+    <a:masterClrMapping/>
+  </p:clrMapOvr>
+</p:sld>
+</file>
+
+<file path=ppt/slides/slide20.xml><?xml version="1.0" encoding="utf-8"?>
+<p:sld xmlns:a="http://schemas.openxmlformats.org/drawingml/2006/main" xmlns:r="http://schemas.openxmlformats.org/officeDocument/2006/relationships" xmlns:mc="http://schemas.openxmlformats.org/markup-compatibility/2006" xmlns:mv="urn:schemas-microsoft-com:mac:vml" xmlns:p="http://schemas.openxmlformats.org/presentationml/2006/main" xmlns:c="http://schemas.openxmlformats.org/drawingml/2006/chart" xmlns:dgm="http://schemas.openxmlformats.org/drawingml/2006/diagram" xmlns:o="urn:schemas-microsoft-com:office:office" xmlns:v="urn:schemas-microsoft-com:vml" xmlns:pvml="urn:schemas-microsoft-com:office:powerpoint" xmlns:com="http://schemas.openxmlformats.org/drawingml/2006/compatibility" xmlns:p14="http://schemas.microsoft.com/office/powerpoint/2010/main" xmlns:p15="http://schemas.microsoft.com/office/powerpoint/2012/main">
+  <p:cSld>
+    <p:spTree>
+      <p:nvGrpSpPr>
+        <p:cNvPr id="225" name="Shape 225"/>
+        <p:cNvGrpSpPr/>
+        <p:nvPr/>
+      </p:nvGrpSpPr>
+      <p:grpSpPr>
+        <a:xfrm>
+          <a:off x="0" y="0"/>
+          <a:ext cx="0" cy="0"/>
+          <a:chOff x="0" y="0"/>
+          <a:chExt cx="0" cy="0"/>
+        </a:xfrm>
+      </p:grpSpPr>
+      <p:sp>
+        <p:nvSpPr>
+          <p:cNvPr id="226" name="Google Shape;226;p33"/>
+          <p:cNvSpPr txBox="1"/>
+          <p:nvPr>
+            <p:ph type="title"/>
+          </p:nvPr>
+        </p:nvSpPr>
+        <p:spPr>
+          <a:xfrm>
+            <a:off x="729450" y="1318650"/>
+            <a:ext cx="7688700" cy="535200"/>
+          </a:xfrm>
+          <a:prstGeom prst="rect">
+            <a:avLst/>
+          </a:prstGeom>
+        </p:spPr>
+        <p:txBody>
+          <a:bodyPr anchorCtr="0" anchor="t" bIns="91425" lIns="91425" spcFirstLastPara="1" rIns="91425" wrap="square" tIns="91425">
+            <a:noAutofit/>
+          </a:bodyPr>
+          <a:lstStyle/>
+          <a:p>
+            <a:pPr indent="0" lvl="0" marL="0" rtl="0" algn="l">
+              <a:spcBef>
+                <a:spcPts val="0"/>
+              </a:spcBef>
+              <a:spcAft>
+                <a:spcPts val="0"/>
+              </a:spcAft>
+              <a:buNone/>
+            </a:pPr>
+            <a:r>
+              <a:rPr lang="de"/>
+              <a:t>Quellen</a:t>
+            </a:r>
+            <a:endParaRPr/>
+          </a:p>
+        </p:txBody>
+      </p:sp>
+      <p:sp>
+        <p:nvSpPr>
+          <p:cNvPr id="227" name="Google Shape;227;p33"/>
+          <p:cNvSpPr txBox="1"/>
+          <p:nvPr>
+            <p:ph idx="1" type="body"/>
+          </p:nvPr>
+        </p:nvSpPr>
+        <p:spPr>
+          <a:xfrm>
+            <a:off x="729450" y="2078875"/>
+            <a:ext cx="7688700" cy="2261100"/>
+          </a:xfrm>
+          <a:prstGeom prst="rect">
+            <a:avLst/>
+          </a:prstGeom>
+        </p:spPr>
+        <p:txBody>
+          <a:bodyPr anchorCtr="0" anchor="t" bIns="91425" lIns="91425" spcFirstLastPara="1" rIns="91425" wrap="square" tIns="91425">
+            <a:noAutofit/>
+          </a:bodyPr>
+          <a:lstStyle/>
+          <a:p>
+            <a:pPr indent="0" lvl="0" marL="0" rtl="0" algn="l">
+              <a:spcBef>
+                <a:spcPts val="0"/>
+              </a:spcBef>
+              <a:spcAft>
+                <a:spcPts val="1600"/>
+              </a:spcAft>
+              <a:buNone/>
+            </a:pPr>
+            <a:r>
+              <a:t/>
+            </a:r>
+            <a:endParaRPr/>
           </a:p>
         </p:txBody>
       </p:sp>
@@ -11047,27 +12792,222 @@
           </a:bodyPr>
           <a:lstStyle/>
           <a:p>
-            <a:pPr indent="0" lvl="0" marL="0" rtl="0" algn="l">
-              <a:spcBef>
-                <a:spcPts val="0"/>
-              </a:spcBef>
-              <a:spcAft>
-                <a:spcPts val="1600"/>
-              </a:spcAft>
-              <a:buNone/>
+            <a:pPr indent="-311150" lvl="0" marL="457200" rtl="0" algn="l">
+              <a:lnSpc>
+                <a:spcPct val="200000"/>
+              </a:lnSpc>
+              <a:spcBef>
+                <a:spcPts val="0"/>
+              </a:spcBef>
+              <a:spcAft>
+                <a:spcPts val="0"/>
+              </a:spcAft>
+              <a:buSzPts val="1300"/>
+              <a:buChar char="●"/>
             </a:pPr>
             <a:r>
-              <a:t/>
+              <a:rPr lang="de"/>
+              <a:t>Mobile Anwendung für Android</a:t>
+            </a:r>
+            <a:endParaRPr/>
+          </a:p>
+          <a:p>
+            <a:pPr indent="-311150" lvl="0" marL="457200" rtl="0" algn="l">
+              <a:lnSpc>
+                <a:spcPct val="200000"/>
+              </a:lnSpc>
+              <a:spcBef>
+                <a:spcPts val="0"/>
+              </a:spcBef>
+              <a:spcAft>
+                <a:spcPts val="0"/>
+              </a:spcAft>
+              <a:buSzPts val="1300"/>
+              <a:buChar char="●"/>
+            </a:pPr>
+            <a:r>
+              <a:rPr lang="de"/>
+              <a:t>Für Kunden und Betreiber</a:t>
+            </a:r>
+            <a:endParaRPr/>
+          </a:p>
+          <a:p>
+            <a:pPr indent="-311150" lvl="0" marL="457200" rtl="0" algn="l">
+              <a:lnSpc>
+                <a:spcPct val="200000"/>
+              </a:lnSpc>
+              <a:spcBef>
+                <a:spcPts val="0"/>
+              </a:spcBef>
+              <a:spcAft>
+                <a:spcPts val="0"/>
+              </a:spcAft>
+              <a:buSzPts val="1300"/>
+              <a:buChar char="●"/>
+            </a:pPr>
+            <a:r>
+              <a:rPr lang="de"/>
+              <a:t>Planung und Kundenbindung für Betreiber</a:t>
+            </a:r>
+            <a:endParaRPr/>
+          </a:p>
+          <a:p>
+            <a:pPr indent="-311150" lvl="0" marL="457200" rtl="0" algn="l">
+              <a:lnSpc>
+                <a:spcPct val="200000"/>
+              </a:lnSpc>
+              <a:spcBef>
+                <a:spcPts val="0"/>
+              </a:spcBef>
+              <a:spcAft>
+                <a:spcPts val="0"/>
+              </a:spcAft>
+              <a:buSzPts val="1300"/>
+              <a:buChar char="●"/>
+            </a:pPr>
+            <a:r>
+              <a:rPr lang="de"/>
+              <a:t>Komfort für Kunden</a:t>
             </a:r>
             <a:endParaRPr/>
           </a:p>
         </p:txBody>
       </p:sp>
+      <p:pic>
+        <p:nvPicPr>
+          <p:cNvPr id="122" name="Google Shape;122;p17"/>
+          <p:cNvPicPr preferRelativeResize="0"/>
+          <p:nvPr/>
+        </p:nvPicPr>
+        <p:blipFill>
+          <a:blip r:embed="rId3">
+            <a:alphaModFix/>
+          </a:blip>
+          <a:stretch>
+            <a:fillRect/>
+          </a:stretch>
+        </p:blipFill>
+        <p:spPr>
+          <a:xfrm>
+            <a:off x="2247900" y="2319338"/>
+            <a:ext cx="4648200" cy="1724025"/>
+          </a:xfrm>
+          <a:prstGeom prst="rect">
+            <a:avLst/>
+          </a:prstGeom>
+          <a:noFill/>
+          <a:ln>
+            <a:noFill/>
+          </a:ln>
+        </p:spPr>
+      </p:pic>
     </p:spTree>
   </p:cSld>
   <p:clrMapOvr>
     <a:masterClrMapping/>
   </p:clrMapOvr>
+  <p:timing>
+    <p:tnLst>
+      <p:par>
+        <p:cTn dur="indefinite" nodeType="tmRoot" restart="never">
+          <p:childTnLst>
+            <p:seq concurrent="1" nextAc="seek">
+              <p:cTn dur="indefinite" id="2" nodeType="mainSeq">
+                <p:childTnLst>
+                  <p:par>
+                    <p:cTn fill="hold">
+                      <p:stCondLst>
+                        <p:cond delay="indefinite"/>
+                      </p:stCondLst>
+                      <p:childTnLst>
+                        <p:par>
+                          <p:cTn fill="hold">
+                            <p:stCondLst>
+                              <p:cond delay="0"/>
+                            </p:stCondLst>
+                            <p:childTnLst>
+                              <p:par>
+                                <p:cTn fill="hold" nodeType="clickEffect" presetClass="exit" presetID="1" presetSubtype="0">
+                                  <p:stCondLst>
+                                    <p:cond delay="0"/>
+                                  </p:stCondLst>
+                                  <p:childTnLst>
+                                    <p:set>
+                                      <p:cBhvr>
+                                        <p:cTn dur="1" fill="hold">
+                                          <p:stCondLst>
+                                            <p:cond delay="0"/>
+                                          </p:stCondLst>
+                                        </p:cTn>
+                                        <p:tgtEl>
+                                          <p:spTgt spid="122"/>
+                                        </p:tgtEl>
+                                        <p:attrNameLst>
+                                          <p:attrName>style.visibility</p:attrName>
+                                        </p:attrNameLst>
+                                      </p:cBhvr>
+                                      <p:to>
+                                        <p:strVal val="hidden"/>
+                                      </p:to>
+                                    </p:set>
+                                  </p:childTnLst>
+                                </p:cTn>
+                              </p:par>
+                              <p:par>
+                                <p:cTn fill="hold" nodeType="withEffect" presetClass="entr" presetID="1" presetSubtype="0">
+                                  <p:stCondLst>
+                                    <p:cond delay="0"/>
+                                  </p:stCondLst>
+                                  <p:childTnLst>
+                                    <p:set>
+                                      <p:cBhvr>
+                                        <p:cTn dur="1" fill="hold">
+                                          <p:stCondLst>
+                                            <p:cond delay="0"/>
+                                          </p:stCondLst>
+                                        </p:cTn>
+                                        <p:tgtEl>
+                                          <p:spTgt spid="121"/>
+                                        </p:tgtEl>
+                                        <p:attrNameLst>
+                                          <p:attrName>style.visibility</p:attrName>
+                                        </p:attrNameLst>
+                                      </p:cBhvr>
+                                      <p:to>
+                                        <p:strVal val="visible"/>
+                                      </p:to>
+                                    </p:set>
+                                  </p:childTnLst>
+                                </p:cTn>
+                              </p:par>
+                            </p:childTnLst>
+                          </p:cTn>
+                        </p:par>
+                      </p:childTnLst>
+                    </p:cTn>
+                  </p:par>
+                </p:childTnLst>
+              </p:cTn>
+              <p:prevCondLst>
+                <p:cond evt="onPrev">
+                  <p:tgtEl>
+                    <p:sldTgt/>
+                  </p:tgtEl>
+                </p:cond>
+              </p:prevCondLst>
+              <p:nextCondLst>
+                <p:cond evt="onNext">
+                  <p:tgtEl>
+                    <p:sldTgt/>
+                  </p:tgtEl>
+                </p:cond>
+              </p:nextCondLst>
+            </p:seq>
+          </p:childTnLst>
+        </p:cTn>
+      </p:par>
+    </p:tnLst>
+  </p:timing>
 </p:sld>
 </file>
 
@@ -11076,7 +13016,7 @@
   <p:cSld>
     <p:spTree>
       <p:nvGrpSpPr>
-        <p:cNvPr id="125" name="Shape 125"/>
+        <p:cNvPr id="126" name="Shape 126"/>
         <p:cNvGrpSpPr/>
         <p:nvPr/>
       </p:nvGrpSpPr>
@@ -11090,7 +13030,7 @@
       </p:grpSpPr>
       <p:sp>
         <p:nvSpPr>
-          <p:cNvPr id="126" name="Google Shape;126;p18"/>
+          <p:cNvPr id="127" name="Google Shape;127;p18"/>
           <p:cNvSpPr txBox="1"/>
           <p:nvPr>
             <p:ph type="title"/>
@@ -11122,7 +13062,7 @@
             </a:pPr>
             <a:r>
               <a:rPr lang="de"/>
-              <a:t>Annahmen</a:t>
+              <a:t>Herangehensweise</a:t>
             </a:r>
             <a:endParaRPr/>
           </a:p>
@@ -11130,7 +13070,7 @@
       </p:sp>
       <p:sp>
         <p:nvSpPr>
-          <p:cNvPr id="127" name="Google Shape;127;p18"/>
+          <p:cNvPr id="128" name="Google Shape;128;p18"/>
           <p:cNvSpPr txBox="1"/>
           <p:nvPr>
             <p:ph idx="1" type="body"/>
@@ -11151,17 +13091,82 @@
           </a:bodyPr>
           <a:lstStyle/>
           <a:p>
-            <a:pPr indent="0" lvl="0" marL="0" rtl="0" algn="l">
-              <a:spcBef>
-                <a:spcPts val="0"/>
-              </a:spcBef>
-              <a:spcAft>
-                <a:spcPts val="1600"/>
-              </a:spcAft>
-              <a:buNone/>
+            <a:pPr indent="-311150" lvl="0" marL="457200" rtl="0" algn="l">
+              <a:lnSpc>
+                <a:spcPct val="200000"/>
+              </a:lnSpc>
+              <a:spcBef>
+                <a:spcPts val="0"/>
+              </a:spcBef>
+              <a:spcAft>
+                <a:spcPts val="0"/>
+              </a:spcAft>
+              <a:buSzPts val="1300"/>
+              <a:buChar char="●"/>
             </a:pPr>
             <a:r>
-              <a:t/>
+              <a:rPr lang="de"/>
+              <a:t>Methoden aus anderen Fächern verwenden</a:t>
+            </a:r>
+            <a:endParaRPr/>
+          </a:p>
+          <a:p>
+            <a:pPr indent="-311150" lvl="0" marL="457200" rtl="0" algn="l">
+              <a:lnSpc>
+                <a:spcPct val="200000"/>
+              </a:lnSpc>
+              <a:spcBef>
+                <a:spcPts val="0"/>
+              </a:spcBef>
+              <a:spcAft>
+                <a:spcPts val="0"/>
+              </a:spcAft>
+              <a:buSzPts val="1300"/>
+              <a:buChar char="●"/>
+            </a:pPr>
+            <a:r>
+              <a:rPr lang="de"/>
+              <a:t>Onlinewerkzeuge nutzen</a:t>
+            </a:r>
+            <a:endParaRPr/>
+          </a:p>
+          <a:p>
+            <a:pPr indent="-311150" lvl="0" marL="457200" rtl="0" algn="l">
+              <a:lnSpc>
+                <a:spcPct val="200000"/>
+              </a:lnSpc>
+              <a:spcBef>
+                <a:spcPts val="0"/>
+              </a:spcBef>
+              <a:spcAft>
+                <a:spcPts val="0"/>
+              </a:spcAft>
+              <a:buSzPts val="1300"/>
+              <a:buChar char="●"/>
+            </a:pPr>
+            <a:r>
+              <a:rPr lang="de"/>
+              <a:t>Regelmäßige Besprechungen</a:t>
+            </a:r>
+            <a:endParaRPr/>
+          </a:p>
+          <a:p>
+            <a:pPr indent="-311150" lvl="0" marL="457200" rtl="0" algn="l">
+              <a:lnSpc>
+                <a:spcPct val="200000"/>
+              </a:lnSpc>
+              <a:spcBef>
+                <a:spcPts val="0"/>
+              </a:spcBef>
+              <a:spcAft>
+                <a:spcPts val="0"/>
+              </a:spcAft>
+              <a:buSzPts val="1300"/>
+              <a:buChar char="●"/>
+            </a:pPr>
+            <a:r>
+              <a:rPr lang="de"/>
+              <a:t>Verteilung der Aufgaben nach Bereichen</a:t>
             </a:r>
             <a:endParaRPr/>
           </a:p>
@@ -11180,7 +13185,7 @@
   <p:cSld>
     <p:spTree>
       <p:nvGrpSpPr>
-        <p:cNvPr id="131" name="Shape 131"/>
+        <p:cNvPr id="132" name="Shape 132"/>
         <p:cNvGrpSpPr/>
         <p:nvPr/>
       </p:nvGrpSpPr>
@@ -11194,7 +13199,7 @@
       </p:grpSpPr>
       <p:sp>
         <p:nvSpPr>
-          <p:cNvPr id="132" name="Google Shape;132;p19"/>
+          <p:cNvPr id="133" name="Google Shape;133;p19"/>
           <p:cNvSpPr txBox="1"/>
           <p:nvPr>
             <p:ph type="title"/>
@@ -11226,7 +13231,7 @@
             </a:pPr>
             <a:r>
               <a:rPr lang="de"/>
-              <a:t>Anforderungen</a:t>
+              <a:t>Herangehensweise</a:t>
             </a:r>
             <a:endParaRPr/>
           </a:p>
@@ -11234,7 +13239,7 @@
       </p:sp>
       <p:sp>
         <p:nvSpPr>
-          <p:cNvPr id="133" name="Google Shape;133;p19"/>
+          <p:cNvPr id="134" name="Google Shape;134;p19"/>
           <p:cNvSpPr txBox="1"/>
           <p:nvPr>
             <p:ph idx="1" type="body"/>
@@ -11256,8 +13261,30 @@
           <a:lstStyle/>
           <a:p>
             <a:pPr indent="0" lvl="0" marL="0" rtl="0" algn="l">
-              <a:spcBef>
-                <a:spcPts val="0"/>
+              <a:lnSpc>
+                <a:spcPct val="115000"/>
+              </a:lnSpc>
+              <a:spcBef>
+                <a:spcPts val="0"/>
+              </a:spcBef>
+              <a:spcAft>
+                <a:spcPts val="0"/>
+              </a:spcAft>
+              <a:buNone/>
+            </a:pPr>
+            <a:r>
+              <a:rPr b="1" lang="de" u="sng"/>
+              <a:t>Werkzeuge</a:t>
+            </a:r>
+            <a:endParaRPr b="1" u="sng"/>
+          </a:p>
+          <a:p>
+            <a:pPr indent="0" lvl="0" marL="0" rtl="0" algn="l">
+              <a:lnSpc>
+                <a:spcPct val="115000"/>
+              </a:lnSpc>
+              <a:spcBef>
+                <a:spcPts val="1600"/>
               </a:spcBef>
               <a:spcAft>
                 <a:spcPts val="1600"/>
@@ -11271,6 +13298,62 @@
           </a:p>
         </p:txBody>
       </p:sp>
+      <p:pic>
+        <p:nvPicPr>
+          <p:cNvPr id="135" name="Google Shape;135;p19"/>
+          <p:cNvPicPr preferRelativeResize="0"/>
+          <p:nvPr/>
+        </p:nvPicPr>
+        <p:blipFill>
+          <a:blip r:embed="rId3">
+            <a:alphaModFix/>
+          </a:blip>
+          <a:stretch>
+            <a:fillRect/>
+          </a:stretch>
+        </p:blipFill>
+        <p:spPr>
+          <a:xfrm>
+            <a:off x="1079200" y="2796025"/>
+            <a:ext cx="2688726" cy="826775"/>
+          </a:xfrm>
+          <a:prstGeom prst="rect">
+            <a:avLst/>
+          </a:prstGeom>
+          <a:noFill/>
+          <a:ln>
+            <a:noFill/>
+          </a:ln>
+        </p:spPr>
+      </p:pic>
+      <p:pic>
+        <p:nvPicPr>
+          <p:cNvPr id="136" name="Google Shape;136;p19"/>
+          <p:cNvPicPr preferRelativeResize="0"/>
+          <p:nvPr/>
+        </p:nvPicPr>
+        <p:blipFill>
+          <a:blip r:embed="rId4">
+            <a:alphaModFix/>
+          </a:blip>
+          <a:stretch>
+            <a:fillRect/>
+          </a:stretch>
+        </p:blipFill>
+        <p:spPr>
+          <a:xfrm>
+            <a:off x="5102000" y="2695538"/>
+            <a:ext cx="2458950" cy="1027775"/>
+          </a:xfrm>
+          <a:prstGeom prst="rect">
+            <a:avLst/>
+          </a:prstGeom>
+          <a:noFill/>
+          <a:ln>
+            <a:noFill/>
+          </a:ln>
+        </p:spPr>
+      </p:pic>
     </p:spTree>
   </p:cSld>
   <p:clrMapOvr>
@@ -11284,7 +13367,7 @@
   <p:cSld>
     <p:spTree>
       <p:nvGrpSpPr>
-        <p:cNvPr id="137" name="Shape 137"/>
+        <p:cNvPr id="140" name="Shape 140"/>
         <p:cNvGrpSpPr/>
         <p:nvPr/>
       </p:nvGrpSpPr>
@@ -11298,7 +13381,7 @@
       </p:grpSpPr>
       <p:sp>
         <p:nvSpPr>
-          <p:cNvPr id="138" name="Google Shape;138;p20"/>
+          <p:cNvPr id="141" name="Google Shape;141;p20"/>
           <p:cNvSpPr txBox="1"/>
           <p:nvPr>
             <p:ph type="title"/>
@@ -11306,8 +13389,8 @@
         </p:nvSpPr>
         <p:spPr>
           <a:xfrm>
-            <a:off x="730000" y="1318650"/>
-            <a:ext cx="3300900" cy="1687200"/>
+            <a:off x="729450" y="1246925"/>
+            <a:ext cx="7688700" cy="535200"/>
           </a:xfrm>
           <a:prstGeom prst="rect">
             <a:avLst/>
@@ -11330,7 +13413,7 @@
             </a:pPr>
             <a:r>
               <a:rPr lang="de"/>
-              <a:t>2. Umsetzung</a:t>
+              <a:t>Herangehensweise</a:t>
             </a:r>
             <a:endParaRPr/>
           </a:p>
@@ -11338,67 +13421,96 @@
       </p:sp>
       <p:sp>
         <p:nvSpPr>
-          <p:cNvPr id="139" name="Google Shape;139;p20"/>
-          <p:cNvSpPr txBox="1"/>
-          <p:nvPr>
-            <p:ph idx="2" type="body"/>
-          </p:nvPr>
+          <p:cNvPr id="142" name="Google Shape;142;p20"/>
+          <p:cNvSpPr/>
+          <p:nvPr/>
         </p:nvSpPr>
         <p:spPr>
           <a:xfrm>
-            <a:off x="5174225" y="1352625"/>
-            <a:ext cx="3374400" cy="3025500"/>
-          </a:xfrm>
-          <a:prstGeom prst="rect">
-            <a:avLst/>
+            <a:off x="0" y="3780789"/>
+            <a:ext cx="2726700" cy="669000"/>
+          </a:xfrm>
+          <a:prstGeom prst="homePlate">
+            <a:avLst>
+              <a:gd fmla="val 50000" name="adj"/>
+            </a:avLst>
           </a:prstGeom>
+          <a:solidFill>
+            <a:srgbClr val="802017"/>
+          </a:solidFill>
+          <a:ln>
+            <a:noFill/>
+          </a:ln>
         </p:spPr>
         <p:txBody>
-          <a:bodyPr anchorCtr="0" anchor="t" bIns="91425" lIns="91425" spcFirstLastPara="1" rIns="91425" wrap="square" tIns="91425">
+          <a:bodyPr anchorCtr="0" anchor="ctr" bIns="91425" lIns="91425" spcFirstLastPara="1" rIns="91425" wrap="square" tIns="91425">
             <a:noAutofit/>
           </a:bodyPr>
           <a:lstStyle/>
           <a:p>
-            <a:pPr indent="0" lvl="0" marL="0" rtl="0" algn="l">
-              <a:spcBef>
-                <a:spcPts val="0"/>
-              </a:spcBef>
-              <a:spcAft>
-                <a:spcPts val="1600"/>
+            <a:pPr indent="0" lvl="0" marL="0" rtl="0" algn="ctr">
+              <a:spcBef>
+                <a:spcPts val="0"/>
+              </a:spcBef>
+              <a:spcAft>
+                <a:spcPts val="0"/>
               </a:spcAft>
               <a:buNone/>
             </a:pPr>
             <a:r>
-              <a:t/>
+              <a:rPr lang="de">
+                <a:solidFill>
+                  <a:srgbClr val="FFFFFF"/>
+                </a:solidFill>
+                <a:latin typeface="Roboto"/>
+                <a:ea typeface="Roboto"/>
+                <a:cs typeface="Roboto"/>
+                <a:sym typeface="Roboto"/>
+              </a:rPr>
+              <a:t>Anforderungen</a:t>
             </a:r>
-            <a:endParaRPr/>
+            <a:endParaRPr>
+              <a:solidFill>
+                <a:srgbClr val="FFFFFF"/>
+              </a:solidFill>
+              <a:latin typeface="Roboto"/>
+              <a:ea typeface="Roboto"/>
+              <a:cs typeface="Roboto"/>
+              <a:sym typeface="Roboto"/>
+            </a:endParaRPr>
           </a:p>
         </p:txBody>
       </p:sp>
       <p:sp>
         <p:nvSpPr>
-          <p:cNvPr id="140" name="Google Shape;140;p20"/>
-          <p:cNvSpPr txBox="1"/>
-          <p:nvPr>
-            <p:ph idx="1" type="subTitle"/>
-          </p:nvPr>
+          <p:cNvPr id="143" name="Google Shape;143;p20"/>
+          <p:cNvSpPr/>
+          <p:nvPr/>
         </p:nvSpPr>
         <p:spPr>
           <a:xfrm>
-            <a:off x="724950" y="3161525"/>
-            <a:ext cx="3300900" cy="759000"/>
-          </a:xfrm>
-          <a:prstGeom prst="rect">
-            <a:avLst/>
+            <a:off x="2263425" y="3780575"/>
+            <a:ext cx="2541300" cy="669000"/>
+          </a:xfrm>
+          <a:prstGeom prst="chevron">
+            <a:avLst>
+              <a:gd fmla="val 50000" name="adj"/>
+            </a:avLst>
           </a:prstGeom>
+          <a:solidFill>
+            <a:srgbClr val="A72A1E"/>
+          </a:solidFill>
+          <a:ln>
+            <a:noFill/>
+          </a:ln>
         </p:spPr>
         <p:txBody>
-          <a:bodyPr anchorCtr="0" anchor="t" bIns="91425" lIns="91425" spcFirstLastPara="1" rIns="91425" wrap="square" tIns="91425">
+          <a:bodyPr anchorCtr="0" anchor="ctr" bIns="91425" lIns="91425" spcFirstLastPara="1" rIns="91425" wrap="square" tIns="91425">
             <a:noAutofit/>
           </a:bodyPr>
           <a:lstStyle/>
           <a:p>
-            <a:pPr indent="0" lvl="0" marL="0" rtl="0" algn="l">
+            <a:pPr indent="0" lvl="0" marL="0" rtl="0" algn="ctr">
               <a:spcBef>
                 <a:spcPts val="0"/>
               </a:spcBef>
@@ -11408,9 +13520,212 @@
               <a:buNone/>
             </a:pPr>
             <a:r>
-              <a:t/>
+              <a:rPr lang="de">
+                <a:solidFill>
+                  <a:schemeClr val="lt1"/>
+                </a:solidFill>
+                <a:latin typeface="Roboto"/>
+                <a:ea typeface="Roboto"/>
+                <a:cs typeface="Roboto"/>
+                <a:sym typeface="Roboto"/>
+              </a:rPr>
+              <a:t>Datenbank</a:t>
             </a:r>
-            <a:endParaRPr/>
+            <a:endParaRPr>
+              <a:solidFill>
+                <a:srgbClr val="FFFFFF"/>
+              </a:solidFill>
+              <a:latin typeface="Roboto"/>
+              <a:ea typeface="Roboto"/>
+              <a:cs typeface="Roboto"/>
+              <a:sym typeface="Roboto"/>
+            </a:endParaRPr>
+          </a:p>
+        </p:txBody>
+      </p:sp>
+      <p:sp>
+        <p:nvSpPr>
+          <p:cNvPr id="144" name="Google Shape;144;p20"/>
+          <p:cNvSpPr/>
+          <p:nvPr/>
+        </p:nvSpPr>
+        <p:spPr>
+          <a:xfrm>
+            <a:off x="4329974" y="3780575"/>
+            <a:ext cx="2541300" cy="669000"/>
+          </a:xfrm>
+          <a:prstGeom prst="chevron">
+            <a:avLst>
+              <a:gd fmla="val 50000" name="adj"/>
+            </a:avLst>
+          </a:prstGeom>
+          <a:solidFill>
+            <a:srgbClr val="B02C20"/>
+          </a:solidFill>
+          <a:ln>
+            <a:noFill/>
+          </a:ln>
+        </p:spPr>
+        <p:txBody>
+          <a:bodyPr anchorCtr="0" anchor="ctr" bIns="91425" lIns="91425" spcFirstLastPara="1" rIns="91425" wrap="square" tIns="91425">
+            <a:noAutofit/>
+          </a:bodyPr>
+          <a:lstStyle/>
+          <a:p>
+            <a:pPr indent="0" lvl="0" marL="0" rtl="0" algn="ctr">
+              <a:spcBef>
+                <a:spcPts val="0"/>
+              </a:spcBef>
+              <a:spcAft>
+                <a:spcPts val="0"/>
+              </a:spcAft>
+              <a:buNone/>
+            </a:pPr>
+            <a:r>
+              <a:rPr lang="de">
+                <a:solidFill>
+                  <a:schemeClr val="lt1"/>
+                </a:solidFill>
+                <a:latin typeface="Roboto"/>
+                <a:ea typeface="Roboto"/>
+                <a:cs typeface="Roboto"/>
+                <a:sym typeface="Roboto"/>
+              </a:rPr>
+              <a:t>Backend</a:t>
+            </a:r>
+            <a:endParaRPr>
+              <a:solidFill>
+                <a:srgbClr val="FFFFFF"/>
+              </a:solidFill>
+              <a:latin typeface="Roboto"/>
+              <a:ea typeface="Roboto"/>
+              <a:cs typeface="Roboto"/>
+              <a:sym typeface="Roboto"/>
+            </a:endParaRPr>
+          </a:p>
+        </p:txBody>
+      </p:sp>
+      <p:sp>
+        <p:nvSpPr>
+          <p:cNvPr id="145" name="Google Shape;145;p20"/>
+          <p:cNvSpPr/>
+          <p:nvPr/>
+        </p:nvSpPr>
+        <p:spPr>
+          <a:xfrm>
+            <a:off x="-77" y="2356375"/>
+            <a:ext cx="9026698" cy="669000"/>
+          </a:xfrm>
+          <a:prstGeom prst="chevron">
+            <a:avLst>
+              <a:gd fmla="val 50000" name="adj"/>
+            </a:avLst>
+          </a:prstGeom>
+          <a:solidFill>
+            <a:srgbClr val="CC4125"/>
+          </a:solidFill>
+          <a:ln>
+            <a:noFill/>
+          </a:ln>
+        </p:spPr>
+        <p:txBody>
+          <a:bodyPr anchorCtr="0" anchor="ctr" bIns="91425" lIns="91425" spcFirstLastPara="1" rIns="91425" wrap="square" tIns="91425">
+            <a:noAutofit/>
+          </a:bodyPr>
+          <a:lstStyle/>
+          <a:p>
+            <a:pPr indent="0" lvl="0" marL="0" rtl="0" algn="ctr">
+              <a:spcBef>
+                <a:spcPts val="0"/>
+              </a:spcBef>
+              <a:spcAft>
+                <a:spcPts val="0"/>
+              </a:spcAft>
+              <a:buNone/>
+            </a:pPr>
+            <a:r>
+              <a:rPr lang="de">
+                <a:solidFill>
+                  <a:schemeClr val="lt1"/>
+                </a:solidFill>
+                <a:latin typeface="Roboto"/>
+                <a:ea typeface="Roboto"/>
+                <a:cs typeface="Roboto"/>
+                <a:sym typeface="Roboto"/>
+              </a:rPr>
+              <a:t>Dokumentation</a:t>
+            </a:r>
+            <a:endParaRPr>
+              <a:solidFill>
+                <a:srgbClr val="FFFFFF"/>
+              </a:solidFill>
+              <a:latin typeface="Roboto"/>
+              <a:ea typeface="Roboto"/>
+              <a:cs typeface="Roboto"/>
+              <a:sym typeface="Roboto"/>
+            </a:endParaRPr>
+          </a:p>
+        </p:txBody>
+      </p:sp>
+      <p:sp>
+        <p:nvSpPr>
+          <p:cNvPr id="146" name="Google Shape;146;p20"/>
+          <p:cNvSpPr/>
+          <p:nvPr/>
+        </p:nvSpPr>
+        <p:spPr>
+          <a:xfrm>
+            <a:off x="6472939" y="3780575"/>
+            <a:ext cx="2541300" cy="669000"/>
+          </a:xfrm>
+          <a:prstGeom prst="chevron">
+            <a:avLst>
+              <a:gd fmla="val 50000" name="adj"/>
+            </a:avLst>
+          </a:prstGeom>
+          <a:solidFill>
+            <a:srgbClr val="BE2F22"/>
+          </a:solidFill>
+          <a:ln>
+            <a:noFill/>
+          </a:ln>
+        </p:spPr>
+        <p:txBody>
+          <a:bodyPr anchorCtr="0" anchor="ctr" bIns="91425" lIns="91425" spcFirstLastPara="1" rIns="91425" wrap="square" tIns="91425">
+            <a:noAutofit/>
+          </a:bodyPr>
+          <a:lstStyle/>
+          <a:p>
+            <a:pPr indent="0" lvl="0" marL="0" rtl="0" algn="ctr">
+              <a:spcBef>
+                <a:spcPts val="0"/>
+              </a:spcBef>
+              <a:spcAft>
+                <a:spcPts val="0"/>
+              </a:spcAft>
+              <a:buNone/>
+            </a:pPr>
+            <a:r>
+              <a:rPr lang="de">
+                <a:solidFill>
+                  <a:schemeClr val="lt1"/>
+                </a:solidFill>
+                <a:latin typeface="Roboto"/>
+                <a:ea typeface="Roboto"/>
+                <a:cs typeface="Roboto"/>
+                <a:sym typeface="Roboto"/>
+              </a:rPr>
+              <a:t>Frontend</a:t>
+            </a:r>
+            <a:endParaRPr>
+              <a:solidFill>
+                <a:srgbClr val="FFFFFF"/>
+              </a:solidFill>
+              <a:latin typeface="Roboto"/>
+              <a:ea typeface="Roboto"/>
+              <a:cs typeface="Roboto"/>
+              <a:sym typeface="Roboto"/>
+            </a:endParaRPr>
           </a:p>
         </p:txBody>
       </p:sp>
@@ -11419,6 +13734,248 @@
   <p:clrMapOvr>
     <a:masterClrMapping/>
   </p:clrMapOvr>
+  <p:timing>
+    <p:tnLst>
+      <p:par>
+        <p:cTn dur="indefinite" nodeType="tmRoot" restart="never">
+          <p:childTnLst>
+            <p:seq concurrent="1" nextAc="seek">
+              <p:cTn dur="indefinite" id="2" nodeType="mainSeq">
+                <p:childTnLst>
+                  <p:par>
+                    <p:cTn fill="hold">
+                      <p:stCondLst>
+                        <p:cond delay="indefinite"/>
+                      </p:stCondLst>
+                      <p:childTnLst>
+                        <p:par>
+                          <p:cTn fill="hold">
+                            <p:stCondLst>
+                              <p:cond delay="0"/>
+                            </p:stCondLst>
+                            <p:childTnLst>
+                              <p:par>
+                                <p:cTn fill="hold" nodeType="clickEffect" presetClass="entr" presetID="10" presetSubtype="0">
+                                  <p:stCondLst>
+                                    <p:cond delay="0"/>
+                                  </p:stCondLst>
+                                  <p:childTnLst>
+                                    <p:set>
+                                      <p:cBhvr>
+                                        <p:cTn dur="1" fill="hold">
+                                          <p:stCondLst>
+                                            <p:cond delay="0"/>
+                                          </p:stCondLst>
+                                        </p:cTn>
+                                        <p:tgtEl>
+                                          <p:spTgt spid="142"/>
+                                        </p:tgtEl>
+                                        <p:attrNameLst>
+                                          <p:attrName>style.visibility</p:attrName>
+                                        </p:attrNameLst>
+                                      </p:cBhvr>
+                                      <p:to>
+                                        <p:strVal val="visible"/>
+                                      </p:to>
+                                    </p:set>
+                                    <p:animEffect filter="fade" transition="in">
+                                      <p:cBhvr>
+                                        <p:cTn dur="1000"/>
+                                        <p:tgtEl>
+                                          <p:spTgt spid="142"/>
+                                        </p:tgtEl>
+                                      </p:cBhvr>
+                                    </p:animEffect>
+                                  </p:childTnLst>
+                                </p:cTn>
+                              </p:par>
+                            </p:childTnLst>
+                          </p:cTn>
+                        </p:par>
+                      </p:childTnLst>
+                    </p:cTn>
+                  </p:par>
+                  <p:par>
+                    <p:cTn fill="hold">
+                      <p:stCondLst>
+                        <p:cond delay="indefinite"/>
+                      </p:stCondLst>
+                      <p:childTnLst>
+                        <p:par>
+                          <p:cTn fill="hold">
+                            <p:stCondLst>
+                              <p:cond delay="0"/>
+                            </p:stCondLst>
+                            <p:childTnLst>
+                              <p:par>
+                                <p:cTn fill="hold" nodeType="clickEffect" presetClass="entr" presetID="10" presetSubtype="0">
+                                  <p:stCondLst>
+                                    <p:cond delay="0"/>
+                                  </p:stCondLst>
+                                  <p:childTnLst>
+                                    <p:set>
+                                      <p:cBhvr>
+                                        <p:cTn dur="1" fill="hold">
+                                          <p:stCondLst>
+                                            <p:cond delay="0"/>
+                                          </p:stCondLst>
+                                        </p:cTn>
+                                        <p:tgtEl>
+                                          <p:spTgt spid="143"/>
+                                        </p:tgtEl>
+                                        <p:attrNameLst>
+                                          <p:attrName>style.visibility</p:attrName>
+                                        </p:attrNameLst>
+                                      </p:cBhvr>
+                                      <p:to>
+                                        <p:strVal val="visible"/>
+                                      </p:to>
+                                    </p:set>
+                                    <p:animEffect filter="fade" transition="in">
+                                      <p:cBhvr>
+                                        <p:cTn dur="1000"/>
+                                        <p:tgtEl>
+                                          <p:spTgt spid="143"/>
+                                        </p:tgtEl>
+                                      </p:cBhvr>
+                                    </p:animEffect>
+                                  </p:childTnLst>
+                                </p:cTn>
+                              </p:par>
+                            </p:childTnLst>
+                          </p:cTn>
+                        </p:par>
+                      </p:childTnLst>
+                    </p:cTn>
+                  </p:par>
+                  <p:par>
+                    <p:cTn fill="hold">
+                      <p:stCondLst>
+                        <p:cond delay="indefinite"/>
+                      </p:stCondLst>
+                      <p:childTnLst>
+                        <p:par>
+                          <p:cTn fill="hold">
+                            <p:stCondLst>
+                              <p:cond delay="0"/>
+                            </p:stCondLst>
+                            <p:childTnLst>
+                              <p:par>
+                                <p:cTn fill="hold" nodeType="clickEffect" presetClass="entr" presetID="10" presetSubtype="0">
+                                  <p:stCondLst>
+                                    <p:cond delay="0"/>
+                                  </p:stCondLst>
+                                  <p:childTnLst>
+                                    <p:set>
+                                      <p:cBhvr>
+                                        <p:cTn dur="1" fill="hold">
+                                          <p:stCondLst>
+                                            <p:cond delay="0"/>
+                                          </p:stCondLst>
+                                        </p:cTn>
+                                        <p:tgtEl>
+                                          <p:spTgt spid="144"/>
+                                        </p:tgtEl>
+                                        <p:attrNameLst>
+                                          <p:attrName>style.visibility</p:attrName>
+                                        </p:attrNameLst>
+                                      </p:cBhvr>
+                                      <p:to>
+                                        <p:strVal val="visible"/>
+                                      </p:to>
+                                    </p:set>
+                                    <p:animEffect filter="fade" transition="in">
+                                      <p:cBhvr>
+                                        <p:cTn dur="1000"/>
+                                        <p:tgtEl>
+                                          <p:spTgt spid="144"/>
+                                        </p:tgtEl>
+                                      </p:cBhvr>
+                                    </p:animEffect>
+                                  </p:childTnLst>
+                                </p:cTn>
+                              </p:par>
+                            </p:childTnLst>
+                          </p:cTn>
+                        </p:par>
+                      </p:childTnLst>
+                    </p:cTn>
+                  </p:par>
+                  <p:par>
+                    <p:cTn fill="hold">
+                      <p:stCondLst>
+                        <p:cond delay="indefinite"/>
+                      </p:stCondLst>
+                      <p:childTnLst>
+                        <p:par>
+                          <p:cTn fill="hold">
+                            <p:stCondLst>
+                              <p:cond delay="0"/>
+                            </p:stCondLst>
+                            <p:childTnLst>
+                              <p:par>
+                                <p:cTn fill="hold" nodeType="clickEffect" presetClass="entr" presetID="10" presetSubtype="0">
+                                  <p:stCondLst>
+                                    <p:cond delay="0"/>
+                                  </p:stCondLst>
+                                  <p:childTnLst>
+                                    <p:set>
+                                      <p:cBhvr>
+                                        <p:cTn dur="1" fill="hold">
+                                          <p:stCondLst>
+                                            <p:cond delay="0"/>
+                                          </p:stCondLst>
+                                        </p:cTn>
+                                        <p:tgtEl>
+                                          <p:spTgt spid="146"/>
+                                        </p:tgtEl>
+                                        <p:attrNameLst>
+                                          <p:attrName>style.visibility</p:attrName>
+                                        </p:attrNameLst>
+                                      </p:cBhvr>
+                                      <p:to>
+                                        <p:strVal val="visible"/>
+                                      </p:to>
+                                    </p:set>
+                                    <p:animEffect filter="fade" transition="in">
+                                      <p:cBhvr>
+                                        <p:cTn dur="1000"/>
+                                        <p:tgtEl>
+                                          <p:spTgt spid="146"/>
+                                        </p:tgtEl>
+                                      </p:cBhvr>
+                                    </p:animEffect>
+                                  </p:childTnLst>
+                                </p:cTn>
+                              </p:par>
+                            </p:childTnLst>
+                          </p:cTn>
+                        </p:par>
+                      </p:childTnLst>
+                    </p:cTn>
+                  </p:par>
+                </p:childTnLst>
+              </p:cTn>
+              <p:prevCondLst>
+                <p:cond evt="onPrev">
+                  <p:tgtEl>
+                    <p:sldTgt/>
+                  </p:tgtEl>
+                </p:cond>
+              </p:prevCondLst>
+              <p:nextCondLst>
+                <p:cond evt="onNext">
+                  <p:tgtEl>
+                    <p:sldTgt/>
+                  </p:tgtEl>
+                </p:cond>
+              </p:nextCondLst>
+            </p:seq>
+          </p:childTnLst>
+        </p:cTn>
+      </p:par>
+    </p:tnLst>
+  </p:timing>
 </p:sld>
 </file>
 
@@ -11427,7 +13984,7 @@
   <p:cSld>
     <p:spTree>
       <p:nvGrpSpPr>
-        <p:cNvPr id="144" name="Shape 144"/>
+        <p:cNvPr id="150" name="Shape 150"/>
         <p:cNvGrpSpPr/>
         <p:nvPr/>
       </p:nvGrpSpPr>
@@ -11441,7 +13998,7 @@
       </p:grpSpPr>
       <p:sp>
         <p:nvSpPr>
-          <p:cNvPr id="145" name="Google Shape;145;p21"/>
+          <p:cNvPr id="151" name="Google Shape;151;p21"/>
           <p:cNvSpPr txBox="1"/>
           <p:nvPr>
             <p:ph type="title"/>
@@ -11473,7 +14030,7 @@
             </a:pPr>
             <a:r>
               <a:rPr lang="de"/>
-              <a:t>Herangehensweise</a:t>
+              <a:t>Anforderungen</a:t>
             </a:r>
             <a:endParaRPr/>
           </a:p>
@@ -11481,7 +14038,7 @@
       </p:sp>
       <p:sp>
         <p:nvSpPr>
-          <p:cNvPr id="146" name="Google Shape;146;p21"/>
+          <p:cNvPr id="152" name="Google Shape;152;p21"/>
           <p:cNvSpPr txBox="1"/>
           <p:nvPr>
             <p:ph idx="1" type="body"/>
@@ -11502,17 +14059,82 @@
           </a:bodyPr>
           <a:lstStyle/>
           <a:p>
-            <a:pPr indent="0" lvl="0" marL="0" rtl="0" algn="l">
-              <a:spcBef>
-                <a:spcPts val="0"/>
-              </a:spcBef>
-              <a:spcAft>
-                <a:spcPts val="1600"/>
-              </a:spcAft>
-              <a:buNone/>
+            <a:pPr indent="-311150" lvl="0" marL="457200" rtl="0" algn="l">
+              <a:lnSpc>
+                <a:spcPct val="200000"/>
+              </a:lnSpc>
+              <a:spcBef>
+                <a:spcPts val="0"/>
+              </a:spcBef>
+              <a:spcAft>
+                <a:spcPts val="0"/>
+              </a:spcAft>
+              <a:buSzPts val="1300"/>
+              <a:buChar char="●"/>
             </a:pPr>
             <a:r>
-              <a:t/>
+              <a:rPr lang="de"/>
+              <a:t>Satzschablonen aus dem Requirements Engineering</a:t>
+            </a:r>
+            <a:endParaRPr/>
+          </a:p>
+          <a:p>
+            <a:pPr indent="-311150" lvl="0" marL="457200" rtl="0" algn="l">
+              <a:lnSpc>
+                <a:spcPct val="200000"/>
+              </a:lnSpc>
+              <a:spcBef>
+                <a:spcPts val="0"/>
+              </a:spcBef>
+              <a:spcAft>
+                <a:spcPts val="0"/>
+              </a:spcAft>
+              <a:buSzPts val="1300"/>
+              <a:buChar char="●"/>
+            </a:pPr>
+            <a:r>
+              <a:rPr lang="de"/>
+              <a:t>Feingranularer als Aufgabenblatt</a:t>
+            </a:r>
+            <a:endParaRPr/>
+          </a:p>
+          <a:p>
+            <a:pPr indent="-311150" lvl="0" marL="457200" rtl="0" algn="l">
+              <a:lnSpc>
+                <a:spcPct val="200000"/>
+              </a:lnSpc>
+              <a:spcBef>
+                <a:spcPts val="0"/>
+              </a:spcBef>
+              <a:spcAft>
+                <a:spcPts val="0"/>
+              </a:spcAft>
+              <a:buSzPts val="1300"/>
+              <a:buChar char="●"/>
+            </a:pPr>
+            <a:r>
+              <a:rPr lang="de"/>
+              <a:t>“Muss” und “Soll” Kategorisierung</a:t>
+            </a:r>
+            <a:endParaRPr/>
+          </a:p>
+          <a:p>
+            <a:pPr indent="-311150" lvl="0" marL="457200" rtl="0" algn="l">
+              <a:lnSpc>
+                <a:spcPct val="200000"/>
+              </a:lnSpc>
+              <a:spcBef>
+                <a:spcPts val="0"/>
+              </a:spcBef>
+              <a:spcAft>
+                <a:spcPts val="0"/>
+              </a:spcAft>
+              <a:buSzPts val="1300"/>
+              <a:buChar char="●"/>
+            </a:pPr>
+            <a:r>
+              <a:rPr lang="de"/>
+              <a:t>Anschließende Priorisierung</a:t>
             </a:r>
             <a:endParaRPr/>
           </a:p>
@@ -11531,7 +14153,7 @@
   <p:cSld>
     <p:spTree>
       <p:nvGrpSpPr>
-        <p:cNvPr id="150" name="Shape 150"/>
+        <p:cNvPr id="156" name="Shape 156"/>
         <p:cNvGrpSpPr/>
         <p:nvPr/>
       </p:nvGrpSpPr>
@@ -11545,7 +14167,7 @@
       </p:grpSpPr>
       <p:sp>
         <p:nvSpPr>
-          <p:cNvPr id="151" name="Google Shape;151;p22"/>
+          <p:cNvPr id="157" name="Google Shape;157;p22"/>
           <p:cNvSpPr txBox="1"/>
           <p:nvPr>
             <p:ph type="title"/>
@@ -11577,7 +14199,7 @@
             </a:pPr>
             <a:r>
               <a:rPr lang="de"/>
-              <a:t>Architektur</a:t>
+              <a:t>Sitemap</a:t>
             </a:r>
             <a:endParaRPr/>
           </a:p>
@@ -11585,7 +14207,7 @@
       </p:sp>
       <p:sp>
         <p:nvSpPr>
-          <p:cNvPr id="152" name="Google Shape;152;p22"/>
+          <p:cNvPr id="158" name="Google Shape;158;p22"/>
           <p:cNvSpPr txBox="1"/>
           <p:nvPr>
             <p:ph idx="1" type="body"/>
@@ -11616,12 +14238,41 @@
               <a:buNone/>
             </a:pPr>
             <a:r>
-              <a:t/>
+              <a:rPr lang="de"/>
+              <a:t>Customer</a:t>
             </a:r>
             <a:endParaRPr/>
           </a:p>
         </p:txBody>
       </p:sp>
+      <p:pic>
+        <p:nvPicPr>
+          <p:cNvPr id="159" name="Google Shape;159;p22"/>
+          <p:cNvPicPr preferRelativeResize="0"/>
+          <p:nvPr/>
+        </p:nvPicPr>
+        <p:blipFill>
+          <a:blip r:embed="rId3">
+            <a:alphaModFix/>
+          </a:blip>
+          <a:stretch>
+            <a:fillRect/>
+          </a:stretch>
+        </p:blipFill>
+        <p:spPr>
+          <a:xfrm>
+            <a:off x="3376100" y="962525"/>
+            <a:ext cx="3548400" cy="3990475"/>
+          </a:xfrm>
+          <a:prstGeom prst="rect">
+            <a:avLst/>
+          </a:prstGeom>
+          <a:noFill/>
+          <a:ln>
+            <a:noFill/>
+          </a:ln>
+        </p:spPr>
+      </p:pic>
     </p:spTree>
   </p:cSld>
   <p:clrMapOvr>

</xml_diff>